<commit_message>
Update and small fixes.
</commit_message>
<xml_diff>
--- a/supporting_material/remote_VCS_presentation.pptx
+++ b/supporting_material/remote_VCS_presentation.pptx
@@ -60,7 +60,7 @@
       </p:grpSpPr>
       <p:sp>
         <p:nvSpPr>
-          <p:cNvPr id="28" name="PlaceHolder 1"/>
+          <p:cNvPr id="25" name="PlaceHolder 1"/>
           <p:cNvSpPr>
             <a:spLocks noGrp="1"/>
           </p:cNvSpPr>
@@ -70,8 +70,8 @@
         </p:nvSpPr>
         <p:spPr>
           <a:xfrm>
-            <a:off x="838080" y="365760"/>
-            <a:ext cx="10515240" cy="1325160"/>
+            <a:off x="609480" y="273600"/>
+            <a:ext cx="10972440" cy="1144800"/>
           </a:xfrm>
           <a:prstGeom prst="rect">
             <a:avLst/>
@@ -82,18 +82,16 @@
             <a:noAutofit/>
           </a:bodyPr>
           <a:p>
-            <a:endParaRPr b="0" lang="en-US" sz="1800" spc="-1" strike="noStrike">
-              <a:solidFill>
-                <a:srgbClr val="000000"/>
-              </a:solidFill>
-              <a:latin typeface="Avenir Next LT Pro"/>
-            </a:endParaRPr>
-          </a:p>
-        </p:txBody>
-      </p:sp>
-      <p:sp>
-        <p:nvSpPr>
-          <p:cNvPr id="29" name="PlaceHolder 2"/>
+            <a:pPr algn="ctr"/>
+            <a:endParaRPr b="0" lang="en-US" sz="4400" spc="-1" strike="noStrike">
+              <a:latin typeface="Arial"/>
+            </a:endParaRPr>
+          </a:p>
+        </p:txBody>
+      </p:sp>
+      <p:sp>
+        <p:nvSpPr>
+          <p:cNvPr id="26" name="PlaceHolder 2"/>
           <p:cNvSpPr>
             <a:spLocks noGrp="1"/>
           </p:cNvSpPr>
@@ -103,8 +101,8 @@
         </p:nvSpPr>
         <p:spPr>
           <a:xfrm>
-            <a:off x="838080" y="1949400"/>
-            <a:ext cx="10515240" cy="2000880"/>
+            <a:off x="609480" y="1604520"/>
+            <a:ext cx="10972440" cy="1896840"/>
           </a:xfrm>
           <a:prstGeom prst="rect">
             <a:avLst/>
@@ -115,18 +113,15 @@
             <a:normAutofit/>
           </a:bodyPr>
           <a:p>
-            <a:endParaRPr b="0" lang="en-US" sz="2800" spc="-1" strike="noStrike">
-              <a:solidFill>
-                <a:srgbClr val="ffffff"/>
-              </a:solidFill>
-              <a:latin typeface="Avenir Next LT Pro"/>
-            </a:endParaRPr>
-          </a:p>
-        </p:txBody>
-      </p:sp>
-      <p:sp>
-        <p:nvSpPr>
-          <p:cNvPr id="30" name="PlaceHolder 3"/>
+            <a:endParaRPr b="0" lang="en-US" sz="3200" spc="-1" strike="noStrike">
+              <a:latin typeface="Arial"/>
+            </a:endParaRPr>
+          </a:p>
+        </p:txBody>
+      </p:sp>
+      <p:sp>
+        <p:nvSpPr>
+          <p:cNvPr id="27" name="PlaceHolder 3"/>
           <p:cNvSpPr>
             <a:spLocks noGrp="1"/>
           </p:cNvSpPr>
@@ -136,8 +131,8 @@
         </p:nvSpPr>
         <p:spPr>
           <a:xfrm>
-            <a:off x="838080" y="4140720"/>
-            <a:ext cx="10515240" cy="2000880"/>
+            <a:off x="609480" y="3682080"/>
+            <a:ext cx="10972440" cy="1896840"/>
           </a:xfrm>
           <a:prstGeom prst="rect">
             <a:avLst/>
@@ -148,11 +143,8 @@
             <a:normAutofit/>
           </a:bodyPr>
           <a:p>
-            <a:endParaRPr b="0" lang="en-US" sz="2800" spc="-1" strike="noStrike">
-              <a:solidFill>
-                <a:srgbClr val="ffffff"/>
-              </a:solidFill>
-              <a:latin typeface="Avenir Next LT Pro"/>
+            <a:endParaRPr b="0" lang="en-US" sz="3200" spc="-1" strike="noStrike">
+              <a:latin typeface="Arial"/>
             </a:endParaRPr>
           </a:p>
         </p:txBody>
@@ -181,7 +173,7 @@
       </p:grpSpPr>
       <p:sp>
         <p:nvSpPr>
-          <p:cNvPr id="31" name="PlaceHolder 1"/>
+          <p:cNvPr id="28" name="PlaceHolder 1"/>
           <p:cNvSpPr>
             <a:spLocks noGrp="1"/>
           </p:cNvSpPr>
@@ -191,8 +183,8 @@
         </p:nvSpPr>
         <p:spPr>
           <a:xfrm>
-            <a:off x="838080" y="365760"/>
-            <a:ext cx="10515240" cy="1325160"/>
+            <a:off x="609480" y="273600"/>
+            <a:ext cx="10972440" cy="1144800"/>
           </a:xfrm>
           <a:prstGeom prst="rect">
             <a:avLst/>
@@ -203,18 +195,16 @@
             <a:noAutofit/>
           </a:bodyPr>
           <a:p>
-            <a:endParaRPr b="0" lang="en-US" sz="1800" spc="-1" strike="noStrike">
-              <a:solidFill>
-                <a:srgbClr val="000000"/>
-              </a:solidFill>
-              <a:latin typeface="Avenir Next LT Pro"/>
-            </a:endParaRPr>
-          </a:p>
-        </p:txBody>
-      </p:sp>
-      <p:sp>
-        <p:nvSpPr>
-          <p:cNvPr id="32" name="PlaceHolder 2"/>
+            <a:pPr algn="ctr"/>
+            <a:endParaRPr b="0" lang="en-US" sz="4400" spc="-1" strike="noStrike">
+              <a:latin typeface="Arial"/>
+            </a:endParaRPr>
+          </a:p>
+        </p:txBody>
+      </p:sp>
+      <p:sp>
+        <p:nvSpPr>
+          <p:cNvPr id="29" name="PlaceHolder 2"/>
           <p:cNvSpPr>
             <a:spLocks noGrp="1"/>
           </p:cNvSpPr>
@@ -224,8 +214,8 @@
         </p:nvSpPr>
         <p:spPr>
           <a:xfrm>
-            <a:off x="838080" y="1949400"/>
-            <a:ext cx="5131080" cy="2000880"/>
+            <a:off x="609480" y="1604520"/>
+            <a:ext cx="5354280" cy="1896840"/>
           </a:xfrm>
           <a:prstGeom prst="rect">
             <a:avLst/>
@@ -236,18 +226,15 @@
             <a:normAutofit/>
           </a:bodyPr>
           <a:p>
-            <a:endParaRPr b="0" lang="en-US" sz="2800" spc="-1" strike="noStrike">
-              <a:solidFill>
-                <a:srgbClr val="ffffff"/>
-              </a:solidFill>
-              <a:latin typeface="Avenir Next LT Pro"/>
-            </a:endParaRPr>
-          </a:p>
-        </p:txBody>
-      </p:sp>
-      <p:sp>
-        <p:nvSpPr>
-          <p:cNvPr id="33" name="PlaceHolder 3"/>
+            <a:endParaRPr b="0" lang="en-US" sz="3200" spc="-1" strike="noStrike">
+              <a:latin typeface="Arial"/>
+            </a:endParaRPr>
+          </a:p>
+        </p:txBody>
+      </p:sp>
+      <p:sp>
+        <p:nvSpPr>
+          <p:cNvPr id="30" name="PlaceHolder 3"/>
           <p:cNvSpPr>
             <a:spLocks noGrp="1"/>
           </p:cNvSpPr>
@@ -257,8 +244,8 @@
         </p:nvSpPr>
         <p:spPr>
           <a:xfrm>
-            <a:off x="6226200" y="1949400"/>
-            <a:ext cx="5131080" cy="2000880"/>
+            <a:off x="6231960" y="1604520"/>
+            <a:ext cx="5354280" cy="1896840"/>
           </a:xfrm>
           <a:prstGeom prst="rect">
             <a:avLst/>
@@ -269,18 +256,15 @@
             <a:normAutofit/>
           </a:bodyPr>
           <a:p>
-            <a:endParaRPr b="0" lang="en-US" sz="2800" spc="-1" strike="noStrike">
-              <a:solidFill>
-                <a:srgbClr val="ffffff"/>
-              </a:solidFill>
-              <a:latin typeface="Avenir Next LT Pro"/>
-            </a:endParaRPr>
-          </a:p>
-        </p:txBody>
-      </p:sp>
-      <p:sp>
-        <p:nvSpPr>
-          <p:cNvPr id="34" name="PlaceHolder 4"/>
+            <a:endParaRPr b="0" lang="en-US" sz="3200" spc="-1" strike="noStrike">
+              <a:latin typeface="Arial"/>
+            </a:endParaRPr>
+          </a:p>
+        </p:txBody>
+      </p:sp>
+      <p:sp>
+        <p:nvSpPr>
+          <p:cNvPr id="31" name="PlaceHolder 4"/>
           <p:cNvSpPr>
             <a:spLocks noGrp="1"/>
           </p:cNvSpPr>
@@ -290,8 +274,8 @@
         </p:nvSpPr>
         <p:spPr>
           <a:xfrm>
-            <a:off x="838080" y="4140720"/>
-            <a:ext cx="5131080" cy="2000880"/>
+            <a:off x="609480" y="3682080"/>
+            <a:ext cx="5354280" cy="1896840"/>
           </a:xfrm>
           <a:prstGeom prst="rect">
             <a:avLst/>
@@ -302,18 +286,15 @@
             <a:normAutofit/>
           </a:bodyPr>
           <a:p>
-            <a:endParaRPr b="0" lang="en-US" sz="2800" spc="-1" strike="noStrike">
-              <a:solidFill>
-                <a:srgbClr val="ffffff"/>
-              </a:solidFill>
-              <a:latin typeface="Avenir Next LT Pro"/>
-            </a:endParaRPr>
-          </a:p>
-        </p:txBody>
-      </p:sp>
-      <p:sp>
-        <p:nvSpPr>
-          <p:cNvPr id="35" name="PlaceHolder 5"/>
+            <a:endParaRPr b="0" lang="en-US" sz="3200" spc="-1" strike="noStrike">
+              <a:latin typeface="Arial"/>
+            </a:endParaRPr>
+          </a:p>
+        </p:txBody>
+      </p:sp>
+      <p:sp>
+        <p:nvSpPr>
+          <p:cNvPr id="32" name="PlaceHolder 5"/>
           <p:cNvSpPr>
             <a:spLocks noGrp="1"/>
           </p:cNvSpPr>
@@ -323,8 +304,8 @@
         </p:nvSpPr>
         <p:spPr>
           <a:xfrm>
-            <a:off x="6226200" y="4140720"/>
-            <a:ext cx="5131080" cy="2000880"/>
+            <a:off x="6231960" y="3682080"/>
+            <a:ext cx="5354280" cy="1896840"/>
           </a:xfrm>
           <a:prstGeom prst="rect">
             <a:avLst/>
@@ -335,11 +316,8 @@
             <a:normAutofit/>
           </a:bodyPr>
           <a:p>
-            <a:endParaRPr b="0" lang="en-US" sz="2800" spc="-1" strike="noStrike">
-              <a:solidFill>
-                <a:srgbClr val="ffffff"/>
-              </a:solidFill>
-              <a:latin typeface="Avenir Next LT Pro"/>
+            <a:endParaRPr b="0" lang="en-US" sz="3200" spc="-1" strike="noStrike">
+              <a:latin typeface="Arial"/>
             </a:endParaRPr>
           </a:p>
         </p:txBody>
@@ -368,7 +346,7 @@
       </p:grpSpPr>
       <p:sp>
         <p:nvSpPr>
-          <p:cNvPr id="36" name="PlaceHolder 1"/>
+          <p:cNvPr id="33" name="PlaceHolder 1"/>
           <p:cNvSpPr>
             <a:spLocks noGrp="1"/>
           </p:cNvSpPr>
@@ -378,8 +356,8 @@
         </p:nvSpPr>
         <p:spPr>
           <a:xfrm>
-            <a:off x="838080" y="365760"/>
-            <a:ext cx="10515240" cy="1325160"/>
+            <a:off x="609480" y="273600"/>
+            <a:ext cx="10972440" cy="1144800"/>
           </a:xfrm>
           <a:prstGeom prst="rect">
             <a:avLst/>
@@ -390,18 +368,16 @@
             <a:noAutofit/>
           </a:bodyPr>
           <a:p>
-            <a:endParaRPr b="0" lang="en-US" sz="1800" spc="-1" strike="noStrike">
-              <a:solidFill>
-                <a:srgbClr val="000000"/>
-              </a:solidFill>
-              <a:latin typeface="Avenir Next LT Pro"/>
-            </a:endParaRPr>
-          </a:p>
-        </p:txBody>
-      </p:sp>
-      <p:sp>
-        <p:nvSpPr>
-          <p:cNvPr id="37" name="PlaceHolder 2"/>
+            <a:pPr algn="ctr"/>
+            <a:endParaRPr b="0" lang="en-US" sz="4400" spc="-1" strike="noStrike">
+              <a:latin typeface="Arial"/>
+            </a:endParaRPr>
+          </a:p>
+        </p:txBody>
+      </p:sp>
+      <p:sp>
+        <p:nvSpPr>
+          <p:cNvPr id="34" name="PlaceHolder 2"/>
           <p:cNvSpPr>
             <a:spLocks noGrp="1"/>
           </p:cNvSpPr>
@@ -411,8 +387,8 @@
         </p:nvSpPr>
         <p:spPr>
           <a:xfrm>
-            <a:off x="838080" y="1949400"/>
-            <a:ext cx="3385800" cy="2000880"/>
+            <a:off x="609480" y="1604520"/>
+            <a:ext cx="3533040" cy="1896840"/>
           </a:xfrm>
           <a:prstGeom prst="rect">
             <a:avLst/>
@@ -423,18 +399,15 @@
             <a:normAutofit/>
           </a:bodyPr>
           <a:p>
-            <a:endParaRPr b="0" lang="en-US" sz="2800" spc="-1" strike="noStrike">
-              <a:solidFill>
-                <a:srgbClr val="ffffff"/>
-              </a:solidFill>
-              <a:latin typeface="Avenir Next LT Pro"/>
-            </a:endParaRPr>
-          </a:p>
-        </p:txBody>
-      </p:sp>
-      <p:sp>
-        <p:nvSpPr>
-          <p:cNvPr id="38" name="PlaceHolder 3"/>
+            <a:endParaRPr b="0" lang="en-US" sz="3200" spc="-1" strike="noStrike">
+              <a:latin typeface="Arial"/>
+            </a:endParaRPr>
+          </a:p>
+        </p:txBody>
+      </p:sp>
+      <p:sp>
+        <p:nvSpPr>
+          <p:cNvPr id="35" name="PlaceHolder 3"/>
           <p:cNvSpPr>
             <a:spLocks noGrp="1"/>
           </p:cNvSpPr>
@@ -444,8 +417,8 @@
         </p:nvSpPr>
         <p:spPr>
           <a:xfrm>
-            <a:off x="4393440" y="1949400"/>
-            <a:ext cx="3385800" cy="2000880"/>
+            <a:off x="4319640" y="1604520"/>
+            <a:ext cx="3533040" cy="1896840"/>
           </a:xfrm>
           <a:prstGeom prst="rect">
             <a:avLst/>
@@ -456,18 +429,15 @@
             <a:normAutofit/>
           </a:bodyPr>
           <a:p>
-            <a:endParaRPr b="0" lang="en-US" sz="2800" spc="-1" strike="noStrike">
-              <a:solidFill>
-                <a:srgbClr val="ffffff"/>
-              </a:solidFill>
-              <a:latin typeface="Avenir Next LT Pro"/>
-            </a:endParaRPr>
-          </a:p>
-        </p:txBody>
-      </p:sp>
-      <p:sp>
-        <p:nvSpPr>
-          <p:cNvPr id="39" name="PlaceHolder 4"/>
+            <a:endParaRPr b="0" lang="en-US" sz="3200" spc="-1" strike="noStrike">
+              <a:latin typeface="Arial"/>
+            </a:endParaRPr>
+          </a:p>
+        </p:txBody>
+      </p:sp>
+      <p:sp>
+        <p:nvSpPr>
+          <p:cNvPr id="36" name="PlaceHolder 4"/>
           <p:cNvSpPr>
             <a:spLocks noGrp="1"/>
           </p:cNvSpPr>
@@ -477,8 +447,8 @@
         </p:nvSpPr>
         <p:spPr>
           <a:xfrm>
-            <a:off x="7949160" y="1949400"/>
-            <a:ext cx="3385800" cy="2000880"/>
+            <a:off x="8029800" y="1604520"/>
+            <a:ext cx="3533040" cy="1896840"/>
           </a:xfrm>
           <a:prstGeom prst="rect">
             <a:avLst/>
@@ -489,18 +459,15 @@
             <a:normAutofit/>
           </a:bodyPr>
           <a:p>
-            <a:endParaRPr b="0" lang="en-US" sz="2800" spc="-1" strike="noStrike">
-              <a:solidFill>
-                <a:srgbClr val="ffffff"/>
-              </a:solidFill>
-              <a:latin typeface="Avenir Next LT Pro"/>
-            </a:endParaRPr>
-          </a:p>
-        </p:txBody>
-      </p:sp>
-      <p:sp>
-        <p:nvSpPr>
-          <p:cNvPr id="40" name="PlaceHolder 5"/>
+            <a:endParaRPr b="0" lang="en-US" sz="3200" spc="-1" strike="noStrike">
+              <a:latin typeface="Arial"/>
+            </a:endParaRPr>
+          </a:p>
+        </p:txBody>
+      </p:sp>
+      <p:sp>
+        <p:nvSpPr>
+          <p:cNvPr id="37" name="PlaceHolder 5"/>
           <p:cNvSpPr>
             <a:spLocks noGrp="1"/>
           </p:cNvSpPr>
@@ -510,8 +477,8 @@
         </p:nvSpPr>
         <p:spPr>
           <a:xfrm>
-            <a:off x="838080" y="4140720"/>
-            <a:ext cx="3385800" cy="2000880"/>
+            <a:off x="609480" y="3682080"/>
+            <a:ext cx="3533040" cy="1896840"/>
           </a:xfrm>
           <a:prstGeom prst="rect">
             <a:avLst/>
@@ -522,18 +489,15 @@
             <a:normAutofit/>
           </a:bodyPr>
           <a:p>
-            <a:endParaRPr b="0" lang="en-US" sz="2800" spc="-1" strike="noStrike">
-              <a:solidFill>
-                <a:srgbClr val="ffffff"/>
-              </a:solidFill>
-              <a:latin typeface="Avenir Next LT Pro"/>
-            </a:endParaRPr>
-          </a:p>
-        </p:txBody>
-      </p:sp>
-      <p:sp>
-        <p:nvSpPr>
-          <p:cNvPr id="41" name="PlaceHolder 6"/>
+            <a:endParaRPr b="0" lang="en-US" sz="3200" spc="-1" strike="noStrike">
+              <a:latin typeface="Arial"/>
+            </a:endParaRPr>
+          </a:p>
+        </p:txBody>
+      </p:sp>
+      <p:sp>
+        <p:nvSpPr>
+          <p:cNvPr id="38" name="PlaceHolder 6"/>
           <p:cNvSpPr>
             <a:spLocks noGrp="1"/>
           </p:cNvSpPr>
@@ -543,8 +507,8 @@
         </p:nvSpPr>
         <p:spPr>
           <a:xfrm>
-            <a:off x="4393440" y="4140720"/>
-            <a:ext cx="3385800" cy="2000880"/>
+            <a:off x="4319640" y="3682080"/>
+            <a:ext cx="3533040" cy="1896840"/>
           </a:xfrm>
           <a:prstGeom prst="rect">
             <a:avLst/>
@@ -555,18 +519,15 @@
             <a:normAutofit/>
           </a:bodyPr>
           <a:p>
-            <a:endParaRPr b="0" lang="en-US" sz="2800" spc="-1" strike="noStrike">
-              <a:solidFill>
-                <a:srgbClr val="ffffff"/>
-              </a:solidFill>
-              <a:latin typeface="Avenir Next LT Pro"/>
-            </a:endParaRPr>
-          </a:p>
-        </p:txBody>
-      </p:sp>
-      <p:sp>
-        <p:nvSpPr>
-          <p:cNvPr id="42" name="PlaceHolder 7"/>
+            <a:endParaRPr b="0" lang="en-US" sz="3200" spc="-1" strike="noStrike">
+              <a:latin typeface="Arial"/>
+            </a:endParaRPr>
+          </a:p>
+        </p:txBody>
+      </p:sp>
+      <p:sp>
+        <p:nvSpPr>
+          <p:cNvPr id="39" name="PlaceHolder 7"/>
           <p:cNvSpPr>
             <a:spLocks noGrp="1"/>
           </p:cNvSpPr>
@@ -576,8 +537,8 @@
         </p:nvSpPr>
         <p:spPr>
           <a:xfrm>
-            <a:off x="7949160" y="4140720"/>
-            <a:ext cx="3385800" cy="2000880"/>
+            <a:off x="8029800" y="3682080"/>
+            <a:ext cx="3533040" cy="1896840"/>
           </a:xfrm>
           <a:prstGeom prst="rect">
             <a:avLst/>
@@ -588,11 +549,8 @@
             <a:normAutofit/>
           </a:bodyPr>
           <a:p>
-            <a:endParaRPr b="0" lang="en-US" sz="2800" spc="-1" strike="noStrike">
-              <a:solidFill>
-                <a:srgbClr val="ffffff"/>
-              </a:solidFill>
-              <a:latin typeface="Avenir Next LT Pro"/>
+            <a:endParaRPr b="0" lang="en-US" sz="3200" spc="-1" strike="noStrike">
+              <a:latin typeface="Arial"/>
             </a:endParaRPr>
           </a:p>
         </p:txBody>
@@ -643,7 +601,7 @@
       </p:grpSpPr>
       <p:sp>
         <p:nvSpPr>
-          <p:cNvPr id="50" name="PlaceHolder 1"/>
+          <p:cNvPr id="44" name="PlaceHolder 1"/>
           <p:cNvSpPr>
             <a:spLocks noGrp="1"/>
           </p:cNvSpPr>
@@ -653,8 +611,8 @@
         </p:nvSpPr>
         <p:spPr>
           <a:xfrm>
-            <a:off x="838080" y="365760"/>
-            <a:ext cx="10515240" cy="1325160"/>
+            <a:off x="609480" y="273600"/>
+            <a:ext cx="10972440" cy="1144800"/>
           </a:xfrm>
           <a:prstGeom prst="rect">
             <a:avLst/>
@@ -665,18 +623,16 @@
             <a:noAutofit/>
           </a:bodyPr>
           <a:p>
-            <a:endParaRPr b="0" lang="en-US" sz="1800" spc="-1" strike="noStrike">
-              <a:solidFill>
-                <a:srgbClr val="000000"/>
-              </a:solidFill>
-              <a:latin typeface="Avenir Next LT Pro"/>
-            </a:endParaRPr>
-          </a:p>
-        </p:txBody>
-      </p:sp>
-      <p:sp>
-        <p:nvSpPr>
-          <p:cNvPr id="51" name="PlaceHolder 2"/>
+            <a:pPr algn="ctr"/>
+            <a:endParaRPr b="0" lang="en-US" sz="4400" spc="-1" strike="noStrike">
+              <a:latin typeface="Arial"/>
+            </a:endParaRPr>
+          </a:p>
+        </p:txBody>
+      </p:sp>
+      <p:sp>
+        <p:nvSpPr>
+          <p:cNvPr id="45" name="PlaceHolder 2"/>
           <p:cNvSpPr>
             <a:spLocks noGrp="1"/>
           </p:cNvSpPr>
@@ -686,8 +642,8 @@
         </p:nvSpPr>
         <p:spPr>
           <a:xfrm>
-            <a:off x="838080" y="1949400"/>
-            <a:ext cx="10515240" cy="4195440"/>
+            <a:off x="609480" y="1604520"/>
+            <a:ext cx="10972440" cy="3977280"/>
           </a:xfrm>
           <a:prstGeom prst="rect">
             <a:avLst/>
@@ -729,7 +685,7 @@
       </p:grpSpPr>
       <p:sp>
         <p:nvSpPr>
-          <p:cNvPr id="52" name="PlaceHolder 1"/>
+          <p:cNvPr id="46" name="PlaceHolder 1"/>
           <p:cNvSpPr>
             <a:spLocks noGrp="1"/>
           </p:cNvSpPr>
@@ -739,8 +695,8 @@
         </p:nvSpPr>
         <p:spPr>
           <a:xfrm>
-            <a:off x="838080" y="365760"/>
-            <a:ext cx="10515240" cy="1325160"/>
+            <a:off x="609480" y="273600"/>
+            <a:ext cx="10972440" cy="1144800"/>
           </a:xfrm>
           <a:prstGeom prst="rect">
             <a:avLst/>
@@ -751,18 +707,16 @@
             <a:noAutofit/>
           </a:bodyPr>
           <a:p>
-            <a:endParaRPr b="0" lang="en-US" sz="1800" spc="-1" strike="noStrike">
-              <a:solidFill>
-                <a:srgbClr val="000000"/>
-              </a:solidFill>
-              <a:latin typeface="Avenir Next LT Pro"/>
-            </a:endParaRPr>
-          </a:p>
-        </p:txBody>
-      </p:sp>
-      <p:sp>
-        <p:nvSpPr>
-          <p:cNvPr id="53" name="PlaceHolder 2"/>
+            <a:pPr algn="ctr"/>
+            <a:endParaRPr b="0" lang="en-US" sz="4400" spc="-1" strike="noStrike">
+              <a:latin typeface="Arial"/>
+            </a:endParaRPr>
+          </a:p>
+        </p:txBody>
+      </p:sp>
+      <p:sp>
+        <p:nvSpPr>
+          <p:cNvPr id="47" name="PlaceHolder 2"/>
           <p:cNvSpPr>
             <a:spLocks noGrp="1"/>
           </p:cNvSpPr>
@@ -772,8 +726,8 @@
         </p:nvSpPr>
         <p:spPr>
           <a:xfrm>
-            <a:off x="838080" y="1949400"/>
-            <a:ext cx="10515240" cy="4195440"/>
+            <a:off x="609480" y="1604520"/>
+            <a:ext cx="10972440" cy="3977280"/>
           </a:xfrm>
           <a:prstGeom prst="rect">
             <a:avLst/>
@@ -784,11 +738,8 @@
             <a:normAutofit/>
           </a:bodyPr>
           <a:p>
-            <a:endParaRPr b="0" lang="en-US" sz="2800" spc="-1" strike="noStrike">
-              <a:solidFill>
-                <a:srgbClr val="ffffff"/>
-              </a:solidFill>
-              <a:latin typeface="Avenir Next LT Pro"/>
+            <a:endParaRPr b="0" lang="en-US" sz="3200" spc="-1" strike="noStrike">
+              <a:latin typeface="Arial"/>
             </a:endParaRPr>
           </a:p>
         </p:txBody>
@@ -817,7 +768,7 @@
       </p:grpSpPr>
       <p:sp>
         <p:nvSpPr>
-          <p:cNvPr id="54" name="PlaceHolder 1"/>
+          <p:cNvPr id="48" name="PlaceHolder 1"/>
           <p:cNvSpPr>
             <a:spLocks noGrp="1"/>
           </p:cNvSpPr>
@@ -827,8 +778,8 @@
         </p:nvSpPr>
         <p:spPr>
           <a:xfrm>
-            <a:off x="838080" y="365760"/>
-            <a:ext cx="10515240" cy="1325160"/>
+            <a:off x="609480" y="273600"/>
+            <a:ext cx="10972440" cy="1144800"/>
           </a:xfrm>
           <a:prstGeom prst="rect">
             <a:avLst/>
@@ -839,18 +790,16 @@
             <a:noAutofit/>
           </a:bodyPr>
           <a:p>
-            <a:endParaRPr b="0" lang="en-US" sz="1800" spc="-1" strike="noStrike">
-              <a:solidFill>
-                <a:srgbClr val="000000"/>
-              </a:solidFill>
-              <a:latin typeface="Avenir Next LT Pro"/>
-            </a:endParaRPr>
-          </a:p>
-        </p:txBody>
-      </p:sp>
-      <p:sp>
-        <p:nvSpPr>
-          <p:cNvPr id="55" name="PlaceHolder 2"/>
+            <a:pPr algn="ctr"/>
+            <a:endParaRPr b="0" lang="en-US" sz="4400" spc="-1" strike="noStrike">
+              <a:latin typeface="Arial"/>
+            </a:endParaRPr>
+          </a:p>
+        </p:txBody>
+      </p:sp>
+      <p:sp>
+        <p:nvSpPr>
+          <p:cNvPr id="49" name="PlaceHolder 2"/>
           <p:cNvSpPr>
             <a:spLocks noGrp="1"/>
           </p:cNvSpPr>
@@ -860,8 +809,8 @@
         </p:nvSpPr>
         <p:spPr>
           <a:xfrm>
-            <a:off x="838080" y="1949400"/>
-            <a:ext cx="5131080" cy="4195440"/>
+            <a:off x="609480" y="1604520"/>
+            <a:ext cx="5354280" cy="3977280"/>
           </a:xfrm>
           <a:prstGeom prst="rect">
             <a:avLst/>
@@ -872,18 +821,15 @@
             <a:normAutofit/>
           </a:bodyPr>
           <a:p>
-            <a:endParaRPr b="0" lang="en-US" sz="2800" spc="-1" strike="noStrike">
-              <a:solidFill>
-                <a:srgbClr val="ffffff"/>
-              </a:solidFill>
-              <a:latin typeface="Avenir Next LT Pro"/>
-            </a:endParaRPr>
-          </a:p>
-        </p:txBody>
-      </p:sp>
-      <p:sp>
-        <p:nvSpPr>
-          <p:cNvPr id="56" name="PlaceHolder 3"/>
+            <a:endParaRPr b="0" lang="en-US" sz="3200" spc="-1" strike="noStrike">
+              <a:latin typeface="Arial"/>
+            </a:endParaRPr>
+          </a:p>
+        </p:txBody>
+      </p:sp>
+      <p:sp>
+        <p:nvSpPr>
+          <p:cNvPr id="50" name="PlaceHolder 3"/>
           <p:cNvSpPr>
             <a:spLocks noGrp="1"/>
           </p:cNvSpPr>
@@ -893,8 +839,8 @@
         </p:nvSpPr>
         <p:spPr>
           <a:xfrm>
-            <a:off x="6226200" y="1949400"/>
-            <a:ext cx="5131080" cy="4195440"/>
+            <a:off x="6231960" y="1604520"/>
+            <a:ext cx="5354280" cy="3977280"/>
           </a:xfrm>
           <a:prstGeom prst="rect">
             <a:avLst/>
@@ -905,11 +851,8 @@
             <a:normAutofit/>
           </a:bodyPr>
           <a:p>
-            <a:endParaRPr b="0" lang="en-US" sz="2800" spc="-1" strike="noStrike">
-              <a:solidFill>
-                <a:srgbClr val="ffffff"/>
-              </a:solidFill>
-              <a:latin typeface="Avenir Next LT Pro"/>
+            <a:endParaRPr b="0" lang="en-US" sz="3200" spc="-1" strike="noStrike">
+              <a:latin typeface="Arial"/>
             </a:endParaRPr>
           </a:p>
         </p:txBody>
@@ -938,7 +881,7 @@
       </p:grpSpPr>
       <p:sp>
         <p:nvSpPr>
-          <p:cNvPr id="57" name="PlaceHolder 1"/>
+          <p:cNvPr id="51" name="PlaceHolder 1"/>
           <p:cNvSpPr>
             <a:spLocks noGrp="1"/>
           </p:cNvSpPr>
@@ -948,8 +891,8 @@
         </p:nvSpPr>
         <p:spPr>
           <a:xfrm>
-            <a:off x="838080" y="365760"/>
-            <a:ext cx="10515240" cy="1325160"/>
+            <a:off x="609480" y="273600"/>
+            <a:ext cx="10972440" cy="1144800"/>
           </a:xfrm>
           <a:prstGeom prst="rect">
             <a:avLst/>
@@ -960,11 +903,9 @@
             <a:noAutofit/>
           </a:bodyPr>
           <a:p>
-            <a:endParaRPr b="0" lang="en-US" sz="1800" spc="-1" strike="noStrike">
-              <a:solidFill>
-                <a:srgbClr val="000000"/>
-              </a:solidFill>
-              <a:latin typeface="Avenir Next LT Pro"/>
+            <a:pPr algn="ctr"/>
+            <a:endParaRPr b="0" lang="en-US" sz="4400" spc="-1" strike="noStrike">
+              <a:latin typeface="Arial"/>
             </a:endParaRPr>
           </a:p>
         </p:txBody>
@@ -993,7 +934,7 @@
       </p:grpSpPr>
       <p:sp>
         <p:nvSpPr>
-          <p:cNvPr id="58" name="PlaceHolder 1"/>
+          <p:cNvPr id="52" name="PlaceHolder 1"/>
           <p:cNvSpPr>
             <a:spLocks noGrp="1"/>
           </p:cNvSpPr>
@@ -1003,8 +944,8 @@
         </p:nvSpPr>
         <p:spPr>
           <a:xfrm>
-            <a:off x="838080" y="365760"/>
-            <a:ext cx="10515240" cy="6144120"/>
+            <a:off x="609480" y="273600"/>
+            <a:ext cx="10972440" cy="5307840"/>
           </a:xfrm>
           <a:prstGeom prst="rect">
             <a:avLst/>
@@ -1046,7 +987,7 @@
       </p:grpSpPr>
       <p:sp>
         <p:nvSpPr>
-          <p:cNvPr id="59" name="PlaceHolder 1"/>
+          <p:cNvPr id="53" name="PlaceHolder 1"/>
           <p:cNvSpPr>
             <a:spLocks noGrp="1"/>
           </p:cNvSpPr>
@@ -1056,8 +997,8 @@
         </p:nvSpPr>
         <p:spPr>
           <a:xfrm>
-            <a:off x="838080" y="365760"/>
-            <a:ext cx="10515240" cy="1325160"/>
+            <a:off x="609480" y="273600"/>
+            <a:ext cx="10972440" cy="1144800"/>
           </a:xfrm>
           <a:prstGeom prst="rect">
             <a:avLst/>
@@ -1068,18 +1009,16 @@
             <a:noAutofit/>
           </a:bodyPr>
           <a:p>
-            <a:endParaRPr b="0" lang="en-US" sz="1800" spc="-1" strike="noStrike">
-              <a:solidFill>
-                <a:srgbClr val="000000"/>
-              </a:solidFill>
-              <a:latin typeface="Avenir Next LT Pro"/>
-            </a:endParaRPr>
-          </a:p>
-        </p:txBody>
-      </p:sp>
-      <p:sp>
-        <p:nvSpPr>
-          <p:cNvPr id="60" name="PlaceHolder 2"/>
+            <a:pPr algn="ctr"/>
+            <a:endParaRPr b="0" lang="en-US" sz="4400" spc="-1" strike="noStrike">
+              <a:latin typeface="Arial"/>
+            </a:endParaRPr>
+          </a:p>
+        </p:txBody>
+      </p:sp>
+      <p:sp>
+        <p:nvSpPr>
+          <p:cNvPr id="54" name="PlaceHolder 2"/>
           <p:cNvSpPr>
             <a:spLocks noGrp="1"/>
           </p:cNvSpPr>
@@ -1089,8 +1028,8 @@
         </p:nvSpPr>
         <p:spPr>
           <a:xfrm>
-            <a:off x="838080" y="1949400"/>
-            <a:ext cx="5131080" cy="2000880"/>
+            <a:off x="609480" y="1604520"/>
+            <a:ext cx="5354280" cy="1896840"/>
           </a:xfrm>
           <a:prstGeom prst="rect">
             <a:avLst/>
@@ -1101,18 +1040,15 @@
             <a:normAutofit/>
           </a:bodyPr>
           <a:p>
-            <a:endParaRPr b="0" lang="en-US" sz="2800" spc="-1" strike="noStrike">
-              <a:solidFill>
-                <a:srgbClr val="ffffff"/>
-              </a:solidFill>
-              <a:latin typeface="Avenir Next LT Pro"/>
-            </a:endParaRPr>
-          </a:p>
-        </p:txBody>
-      </p:sp>
-      <p:sp>
-        <p:nvSpPr>
-          <p:cNvPr id="61" name="PlaceHolder 3"/>
+            <a:endParaRPr b="0" lang="en-US" sz="3200" spc="-1" strike="noStrike">
+              <a:latin typeface="Arial"/>
+            </a:endParaRPr>
+          </a:p>
+        </p:txBody>
+      </p:sp>
+      <p:sp>
+        <p:nvSpPr>
+          <p:cNvPr id="55" name="PlaceHolder 3"/>
           <p:cNvSpPr>
             <a:spLocks noGrp="1"/>
           </p:cNvSpPr>
@@ -1122,8 +1058,8 @@
         </p:nvSpPr>
         <p:spPr>
           <a:xfrm>
-            <a:off x="6226200" y="1949400"/>
-            <a:ext cx="5131080" cy="4195440"/>
+            <a:off x="6231960" y="1604520"/>
+            <a:ext cx="5354280" cy="3977280"/>
           </a:xfrm>
           <a:prstGeom prst="rect">
             <a:avLst/>
@@ -1134,18 +1070,15 @@
             <a:normAutofit/>
           </a:bodyPr>
           <a:p>
-            <a:endParaRPr b="0" lang="en-US" sz="2800" spc="-1" strike="noStrike">
-              <a:solidFill>
-                <a:srgbClr val="ffffff"/>
-              </a:solidFill>
-              <a:latin typeface="Avenir Next LT Pro"/>
-            </a:endParaRPr>
-          </a:p>
-        </p:txBody>
-      </p:sp>
-      <p:sp>
-        <p:nvSpPr>
-          <p:cNvPr id="62" name="PlaceHolder 4"/>
+            <a:endParaRPr b="0" lang="en-US" sz="3200" spc="-1" strike="noStrike">
+              <a:latin typeface="Arial"/>
+            </a:endParaRPr>
+          </a:p>
+        </p:txBody>
+      </p:sp>
+      <p:sp>
+        <p:nvSpPr>
+          <p:cNvPr id="56" name="PlaceHolder 4"/>
           <p:cNvSpPr>
             <a:spLocks noGrp="1"/>
           </p:cNvSpPr>
@@ -1155,8 +1088,8 @@
         </p:nvSpPr>
         <p:spPr>
           <a:xfrm>
-            <a:off x="838080" y="4140720"/>
-            <a:ext cx="5131080" cy="2000880"/>
+            <a:off x="609480" y="3682080"/>
+            <a:ext cx="5354280" cy="1896840"/>
           </a:xfrm>
           <a:prstGeom prst="rect">
             <a:avLst/>
@@ -1167,11 +1100,8 @@
             <a:normAutofit/>
           </a:bodyPr>
           <a:p>
-            <a:endParaRPr b="0" lang="en-US" sz="2800" spc="-1" strike="noStrike">
-              <a:solidFill>
-                <a:srgbClr val="ffffff"/>
-              </a:solidFill>
-              <a:latin typeface="Avenir Next LT Pro"/>
+            <a:endParaRPr b="0" lang="en-US" sz="3200" spc="-1" strike="noStrike">
+              <a:latin typeface="Arial"/>
             </a:endParaRPr>
           </a:p>
         </p:txBody>
@@ -1200,7 +1130,7 @@
       </p:grpSpPr>
       <p:sp>
         <p:nvSpPr>
-          <p:cNvPr id="7" name="PlaceHolder 1"/>
+          <p:cNvPr id="4" name="PlaceHolder 1"/>
           <p:cNvSpPr>
             <a:spLocks noGrp="1"/>
           </p:cNvSpPr>
@@ -1210,8 +1140,8 @@
         </p:nvSpPr>
         <p:spPr>
           <a:xfrm>
-            <a:off x="838080" y="365760"/>
-            <a:ext cx="10515240" cy="1325160"/>
+            <a:off x="609480" y="273600"/>
+            <a:ext cx="10972440" cy="1144800"/>
           </a:xfrm>
           <a:prstGeom prst="rect">
             <a:avLst/>
@@ -1222,18 +1152,16 @@
             <a:noAutofit/>
           </a:bodyPr>
           <a:p>
-            <a:endParaRPr b="0" lang="en-US" sz="1800" spc="-1" strike="noStrike">
-              <a:solidFill>
-                <a:srgbClr val="000000"/>
-              </a:solidFill>
-              <a:latin typeface="Avenir Next LT Pro"/>
-            </a:endParaRPr>
-          </a:p>
-        </p:txBody>
-      </p:sp>
-      <p:sp>
-        <p:nvSpPr>
-          <p:cNvPr id="8" name="PlaceHolder 2"/>
+            <a:pPr algn="ctr"/>
+            <a:endParaRPr b="0" lang="en-US" sz="4400" spc="-1" strike="noStrike">
+              <a:latin typeface="Arial"/>
+            </a:endParaRPr>
+          </a:p>
+        </p:txBody>
+      </p:sp>
+      <p:sp>
+        <p:nvSpPr>
+          <p:cNvPr id="5" name="PlaceHolder 2"/>
           <p:cNvSpPr>
             <a:spLocks noGrp="1"/>
           </p:cNvSpPr>
@@ -1243,8 +1171,8 @@
         </p:nvSpPr>
         <p:spPr>
           <a:xfrm>
-            <a:off x="838080" y="1949400"/>
-            <a:ext cx="10515240" cy="4195440"/>
+            <a:off x="609480" y="1604520"/>
+            <a:ext cx="10972440" cy="3977280"/>
           </a:xfrm>
           <a:prstGeom prst="rect">
             <a:avLst/>
@@ -1286,7 +1214,7 @@
       </p:grpSpPr>
       <p:sp>
         <p:nvSpPr>
-          <p:cNvPr id="63" name="PlaceHolder 1"/>
+          <p:cNvPr id="57" name="PlaceHolder 1"/>
           <p:cNvSpPr>
             <a:spLocks noGrp="1"/>
           </p:cNvSpPr>
@@ -1296,8 +1224,8 @@
         </p:nvSpPr>
         <p:spPr>
           <a:xfrm>
-            <a:off x="838080" y="365760"/>
-            <a:ext cx="10515240" cy="1325160"/>
+            <a:off x="609480" y="273600"/>
+            <a:ext cx="10972440" cy="1144800"/>
           </a:xfrm>
           <a:prstGeom prst="rect">
             <a:avLst/>
@@ -1308,18 +1236,16 @@
             <a:noAutofit/>
           </a:bodyPr>
           <a:p>
-            <a:endParaRPr b="0" lang="en-US" sz="1800" spc="-1" strike="noStrike">
-              <a:solidFill>
-                <a:srgbClr val="000000"/>
-              </a:solidFill>
-              <a:latin typeface="Avenir Next LT Pro"/>
-            </a:endParaRPr>
-          </a:p>
-        </p:txBody>
-      </p:sp>
-      <p:sp>
-        <p:nvSpPr>
-          <p:cNvPr id="64" name="PlaceHolder 2"/>
+            <a:pPr algn="ctr"/>
+            <a:endParaRPr b="0" lang="en-US" sz="4400" spc="-1" strike="noStrike">
+              <a:latin typeface="Arial"/>
+            </a:endParaRPr>
+          </a:p>
+        </p:txBody>
+      </p:sp>
+      <p:sp>
+        <p:nvSpPr>
+          <p:cNvPr id="58" name="PlaceHolder 2"/>
           <p:cNvSpPr>
             <a:spLocks noGrp="1"/>
           </p:cNvSpPr>
@@ -1329,8 +1255,8 @@
         </p:nvSpPr>
         <p:spPr>
           <a:xfrm>
-            <a:off x="838080" y="1949400"/>
-            <a:ext cx="5131080" cy="4195440"/>
+            <a:off x="609480" y="1604520"/>
+            <a:ext cx="5354280" cy="3977280"/>
           </a:xfrm>
           <a:prstGeom prst="rect">
             <a:avLst/>
@@ -1341,18 +1267,15 @@
             <a:normAutofit/>
           </a:bodyPr>
           <a:p>
-            <a:endParaRPr b="0" lang="en-US" sz="2800" spc="-1" strike="noStrike">
-              <a:solidFill>
-                <a:srgbClr val="ffffff"/>
-              </a:solidFill>
-              <a:latin typeface="Avenir Next LT Pro"/>
-            </a:endParaRPr>
-          </a:p>
-        </p:txBody>
-      </p:sp>
-      <p:sp>
-        <p:nvSpPr>
-          <p:cNvPr id="65" name="PlaceHolder 3"/>
+            <a:endParaRPr b="0" lang="en-US" sz="3200" spc="-1" strike="noStrike">
+              <a:latin typeface="Arial"/>
+            </a:endParaRPr>
+          </a:p>
+        </p:txBody>
+      </p:sp>
+      <p:sp>
+        <p:nvSpPr>
+          <p:cNvPr id="59" name="PlaceHolder 3"/>
           <p:cNvSpPr>
             <a:spLocks noGrp="1"/>
           </p:cNvSpPr>
@@ -1362,8 +1285,8 @@
         </p:nvSpPr>
         <p:spPr>
           <a:xfrm>
-            <a:off x="6226200" y="1949400"/>
-            <a:ext cx="5131080" cy="2000880"/>
+            <a:off x="6231960" y="1604520"/>
+            <a:ext cx="5354280" cy="1896840"/>
           </a:xfrm>
           <a:prstGeom prst="rect">
             <a:avLst/>
@@ -1374,18 +1297,15 @@
             <a:normAutofit/>
           </a:bodyPr>
           <a:p>
-            <a:endParaRPr b="0" lang="en-US" sz="2800" spc="-1" strike="noStrike">
-              <a:solidFill>
-                <a:srgbClr val="ffffff"/>
-              </a:solidFill>
-              <a:latin typeface="Avenir Next LT Pro"/>
-            </a:endParaRPr>
-          </a:p>
-        </p:txBody>
-      </p:sp>
-      <p:sp>
-        <p:nvSpPr>
-          <p:cNvPr id="66" name="PlaceHolder 4"/>
+            <a:endParaRPr b="0" lang="en-US" sz="3200" spc="-1" strike="noStrike">
+              <a:latin typeface="Arial"/>
+            </a:endParaRPr>
+          </a:p>
+        </p:txBody>
+      </p:sp>
+      <p:sp>
+        <p:nvSpPr>
+          <p:cNvPr id="60" name="PlaceHolder 4"/>
           <p:cNvSpPr>
             <a:spLocks noGrp="1"/>
           </p:cNvSpPr>
@@ -1395,8 +1315,8 @@
         </p:nvSpPr>
         <p:spPr>
           <a:xfrm>
-            <a:off x="6226200" y="4140720"/>
-            <a:ext cx="5131080" cy="2000880"/>
+            <a:off x="6231960" y="3682080"/>
+            <a:ext cx="5354280" cy="1896840"/>
           </a:xfrm>
           <a:prstGeom prst="rect">
             <a:avLst/>
@@ -1407,11 +1327,8 @@
             <a:normAutofit/>
           </a:bodyPr>
           <a:p>
-            <a:endParaRPr b="0" lang="en-US" sz="2800" spc="-1" strike="noStrike">
-              <a:solidFill>
-                <a:srgbClr val="ffffff"/>
-              </a:solidFill>
-              <a:latin typeface="Avenir Next LT Pro"/>
+            <a:endParaRPr b="0" lang="en-US" sz="3200" spc="-1" strike="noStrike">
+              <a:latin typeface="Arial"/>
             </a:endParaRPr>
           </a:p>
         </p:txBody>
@@ -1440,7 +1357,7 @@
       </p:grpSpPr>
       <p:sp>
         <p:nvSpPr>
-          <p:cNvPr id="67" name="PlaceHolder 1"/>
+          <p:cNvPr id="61" name="PlaceHolder 1"/>
           <p:cNvSpPr>
             <a:spLocks noGrp="1"/>
           </p:cNvSpPr>
@@ -1450,8 +1367,8 @@
         </p:nvSpPr>
         <p:spPr>
           <a:xfrm>
-            <a:off x="838080" y="365760"/>
-            <a:ext cx="10515240" cy="1325160"/>
+            <a:off x="609480" y="273600"/>
+            <a:ext cx="10972440" cy="1144800"/>
           </a:xfrm>
           <a:prstGeom prst="rect">
             <a:avLst/>
@@ -1462,18 +1379,16 @@
             <a:noAutofit/>
           </a:bodyPr>
           <a:p>
-            <a:endParaRPr b="0" lang="en-US" sz="1800" spc="-1" strike="noStrike">
-              <a:solidFill>
-                <a:srgbClr val="000000"/>
-              </a:solidFill>
-              <a:latin typeface="Avenir Next LT Pro"/>
-            </a:endParaRPr>
-          </a:p>
-        </p:txBody>
-      </p:sp>
-      <p:sp>
-        <p:nvSpPr>
-          <p:cNvPr id="68" name="PlaceHolder 2"/>
+            <a:pPr algn="ctr"/>
+            <a:endParaRPr b="0" lang="en-US" sz="4400" spc="-1" strike="noStrike">
+              <a:latin typeface="Arial"/>
+            </a:endParaRPr>
+          </a:p>
+        </p:txBody>
+      </p:sp>
+      <p:sp>
+        <p:nvSpPr>
+          <p:cNvPr id="62" name="PlaceHolder 2"/>
           <p:cNvSpPr>
             <a:spLocks noGrp="1"/>
           </p:cNvSpPr>
@@ -1483,8 +1398,8 @@
         </p:nvSpPr>
         <p:spPr>
           <a:xfrm>
-            <a:off x="838080" y="1949400"/>
-            <a:ext cx="5131080" cy="2000880"/>
+            <a:off x="609480" y="1604520"/>
+            <a:ext cx="5354280" cy="1896840"/>
           </a:xfrm>
           <a:prstGeom prst="rect">
             <a:avLst/>
@@ -1495,18 +1410,15 @@
             <a:normAutofit/>
           </a:bodyPr>
           <a:p>
-            <a:endParaRPr b="0" lang="en-US" sz="2800" spc="-1" strike="noStrike">
-              <a:solidFill>
-                <a:srgbClr val="ffffff"/>
-              </a:solidFill>
-              <a:latin typeface="Avenir Next LT Pro"/>
-            </a:endParaRPr>
-          </a:p>
-        </p:txBody>
-      </p:sp>
-      <p:sp>
-        <p:nvSpPr>
-          <p:cNvPr id="69" name="PlaceHolder 3"/>
+            <a:endParaRPr b="0" lang="en-US" sz="3200" spc="-1" strike="noStrike">
+              <a:latin typeface="Arial"/>
+            </a:endParaRPr>
+          </a:p>
+        </p:txBody>
+      </p:sp>
+      <p:sp>
+        <p:nvSpPr>
+          <p:cNvPr id="63" name="PlaceHolder 3"/>
           <p:cNvSpPr>
             <a:spLocks noGrp="1"/>
           </p:cNvSpPr>
@@ -1516,8 +1428,8 @@
         </p:nvSpPr>
         <p:spPr>
           <a:xfrm>
-            <a:off x="6226200" y="1949400"/>
-            <a:ext cx="5131080" cy="2000880"/>
+            <a:off x="6231960" y="1604520"/>
+            <a:ext cx="5354280" cy="1896840"/>
           </a:xfrm>
           <a:prstGeom prst="rect">
             <a:avLst/>
@@ -1528,18 +1440,15 @@
             <a:normAutofit/>
           </a:bodyPr>
           <a:p>
-            <a:endParaRPr b="0" lang="en-US" sz="2800" spc="-1" strike="noStrike">
-              <a:solidFill>
-                <a:srgbClr val="ffffff"/>
-              </a:solidFill>
-              <a:latin typeface="Avenir Next LT Pro"/>
-            </a:endParaRPr>
-          </a:p>
-        </p:txBody>
-      </p:sp>
-      <p:sp>
-        <p:nvSpPr>
-          <p:cNvPr id="70" name="PlaceHolder 4"/>
+            <a:endParaRPr b="0" lang="en-US" sz="3200" spc="-1" strike="noStrike">
+              <a:latin typeface="Arial"/>
+            </a:endParaRPr>
+          </a:p>
+        </p:txBody>
+      </p:sp>
+      <p:sp>
+        <p:nvSpPr>
+          <p:cNvPr id="64" name="PlaceHolder 4"/>
           <p:cNvSpPr>
             <a:spLocks noGrp="1"/>
           </p:cNvSpPr>
@@ -1549,8 +1458,8 @@
         </p:nvSpPr>
         <p:spPr>
           <a:xfrm>
-            <a:off x="838080" y="4140720"/>
-            <a:ext cx="10515240" cy="2000880"/>
+            <a:off x="609480" y="3682080"/>
+            <a:ext cx="10972440" cy="1896840"/>
           </a:xfrm>
           <a:prstGeom prst="rect">
             <a:avLst/>
@@ -1561,11 +1470,8 @@
             <a:normAutofit/>
           </a:bodyPr>
           <a:p>
-            <a:endParaRPr b="0" lang="en-US" sz="2800" spc="-1" strike="noStrike">
-              <a:solidFill>
-                <a:srgbClr val="ffffff"/>
-              </a:solidFill>
-              <a:latin typeface="Avenir Next LT Pro"/>
+            <a:endParaRPr b="0" lang="en-US" sz="3200" spc="-1" strike="noStrike">
+              <a:latin typeface="Arial"/>
             </a:endParaRPr>
           </a:p>
         </p:txBody>
@@ -1594,7 +1500,7 @@
       </p:grpSpPr>
       <p:sp>
         <p:nvSpPr>
-          <p:cNvPr id="71" name="PlaceHolder 1"/>
+          <p:cNvPr id="65" name="PlaceHolder 1"/>
           <p:cNvSpPr>
             <a:spLocks noGrp="1"/>
           </p:cNvSpPr>
@@ -1604,8 +1510,8 @@
         </p:nvSpPr>
         <p:spPr>
           <a:xfrm>
-            <a:off x="838080" y="365760"/>
-            <a:ext cx="10515240" cy="1325160"/>
+            <a:off x="609480" y="273600"/>
+            <a:ext cx="10972440" cy="1144800"/>
           </a:xfrm>
           <a:prstGeom prst="rect">
             <a:avLst/>
@@ -1616,18 +1522,16 @@
             <a:noAutofit/>
           </a:bodyPr>
           <a:p>
-            <a:endParaRPr b="0" lang="en-US" sz="1800" spc="-1" strike="noStrike">
-              <a:solidFill>
-                <a:srgbClr val="000000"/>
-              </a:solidFill>
-              <a:latin typeface="Avenir Next LT Pro"/>
-            </a:endParaRPr>
-          </a:p>
-        </p:txBody>
-      </p:sp>
-      <p:sp>
-        <p:nvSpPr>
-          <p:cNvPr id="72" name="PlaceHolder 2"/>
+            <a:pPr algn="ctr"/>
+            <a:endParaRPr b="0" lang="en-US" sz="4400" spc="-1" strike="noStrike">
+              <a:latin typeface="Arial"/>
+            </a:endParaRPr>
+          </a:p>
+        </p:txBody>
+      </p:sp>
+      <p:sp>
+        <p:nvSpPr>
+          <p:cNvPr id="66" name="PlaceHolder 2"/>
           <p:cNvSpPr>
             <a:spLocks noGrp="1"/>
           </p:cNvSpPr>
@@ -1637,8 +1541,8 @@
         </p:nvSpPr>
         <p:spPr>
           <a:xfrm>
-            <a:off x="838080" y="1949400"/>
-            <a:ext cx="10515240" cy="2000880"/>
+            <a:off x="609480" y="1604520"/>
+            <a:ext cx="10972440" cy="1896840"/>
           </a:xfrm>
           <a:prstGeom prst="rect">
             <a:avLst/>
@@ -1649,18 +1553,15 @@
             <a:normAutofit/>
           </a:bodyPr>
           <a:p>
-            <a:endParaRPr b="0" lang="en-US" sz="2800" spc="-1" strike="noStrike">
-              <a:solidFill>
-                <a:srgbClr val="ffffff"/>
-              </a:solidFill>
-              <a:latin typeface="Avenir Next LT Pro"/>
-            </a:endParaRPr>
-          </a:p>
-        </p:txBody>
-      </p:sp>
-      <p:sp>
-        <p:nvSpPr>
-          <p:cNvPr id="73" name="PlaceHolder 3"/>
+            <a:endParaRPr b="0" lang="en-US" sz="3200" spc="-1" strike="noStrike">
+              <a:latin typeface="Arial"/>
+            </a:endParaRPr>
+          </a:p>
+        </p:txBody>
+      </p:sp>
+      <p:sp>
+        <p:nvSpPr>
+          <p:cNvPr id="67" name="PlaceHolder 3"/>
           <p:cNvSpPr>
             <a:spLocks noGrp="1"/>
           </p:cNvSpPr>
@@ -1670,8 +1571,8 @@
         </p:nvSpPr>
         <p:spPr>
           <a:xfrm>
-            <a:off x="838080" y="4140720"/>
-            <a:ext cx="10515240" cy="2000880"/>
+            <a:off x="609480" y="3682080"/>
+            <a:ext cx="10972440" cy="1896840"/>
           </a:xfrm>
           <a:prstGeom prst="rect">
             <a:avLst/>
@@ -1682,11 +1583,8 @@
             <a:normAutofit/>
           </a:bodyPr>
           <a:p>
-            <a:endParaRPr b="0" lang="en-US" sz="2800" spc="-1" strike="noStrike">
-              <a:solidFill>
-                <a:srgbClr val="ffffff"/>
-              </a:solidFill>
-              <a:latin typeface="Avenir Next LT Pro"/>
+            <a:endParaRPr b="0" lang="en-US" sz="3200" spc="-1" strike="noStrike">
+              <a:latin typeface="Arial"/>
             </a:endParaRPr>
           </a:p>
         </p:txBody>
@@ -1715,7 +1613,7 @@
       </p:grpSpPr>
       <p:sp>
         <p:nvSpPr>
-          <p:cNvPr id="74" name="PlaceHolder 1"/>
+          <p:cNvPr id="68" name="PlaceHolder 1"/>
           <p:cNvSpPr>
             <a:spLocks noGrp="1"/>
           </p:cNvSpPr>
@@ -1725,8 +1623,8 @@
         </p:nvSpPr>
         <p:spPr>
           <a:xfrm>
-            <a:off x="838080" y="365760"/>
-            <a:ext cx="10515240" cy="1325160"/>
+            <a:off x="609480" y="273600"/>
+            <a:ext cx="10972440" cy="1144800"/>
           </a:xfrm>
           <a:prstGeom prst="rect">
             <a:avLst/>
@@ -1737,18 +1635,16 @@
             <a:noAutofit/>
           </a:bodyPr>
           <a:p>
-            <a:endParaRPr b="0" lang="en-US" sz="1800" spc="-1" strike="noStrike">
-              <a:solidFill>
-                <a:srgbClr val="000000"/>
-              </a:solidFill>
-              <a:latin typeface="Avenir Next LT Pro"/>
-            </a:endParaRPr>
-          </a:p>
-        </p:txBody>
-      </p:sp>
-      <p:sp>
-        <p:nvSpPr>
-          <p:cNvPr id="75" name="PlaceHolder 2"/>
+            <a:pPr algn="ctr"/>
+            <a:endParaRPr b="0" lang="en-US" sz="4400" spc="-1" strike="noStrike">
+              <a:latin typeface="Arial"/>
+            </a:endParaRPr>
+          </a:p>
+        </p:txBody>
+      </p:sp>
+      <p:sp>
+        <p:nvSpPr>
+          <p:cNvPr id="69" name="PlaceHolder 2"/>
           <p:cNvSpPr>
             <a:spLocks noGrp="1"/>
           </p:cNvSpPr>
@@ -1758,8 +1654,8 @@
         </p:nvSpPr>
         <p:spPr>
           <a:xfrm>
-            <a:off x="838080" y="1949400"/>
-            <a:ext cx="5131080" cy="2000880"/>
+            <a:off x="609480" y="1604520"/>
+            <a:ext cx="5354280" cy="1896840"/>
           </a:xfrm>
           <a:prstGeom prst="rect">
             <a:avLst/>
@@ -1770,18 +1666,15 @@
             <a:normAutofit/>
           </a:bodyPr>
           <a:p>
-            <a:endParaRPr b="0" lang="en-US" sz="2800" spc="-1" strike="noStrike">
-              <a:solidFill>
-                <a:srgbClr val="ffffff"/>
-              </a:solidFill>
-              <a:latin typeface="Avenir Next LT Pro"/>
-            </a:endParaRPr>
-          </a:p>
-        </p:txBody>
-      </p:sp>
-      <p:sp>
-        <p:nvSpPr>
-          <p:cNvPr id="76" name="PlaceHolder 3"/>
+            <a:endParaRPr b="0" lang="en-US" sz="3200" spc="-1" strike="noStrike">
+              <a:latin typeface="Arial"/>
+            </a:endParaRPr>
+          </a:p>
+        </p:txBody>
+      </p:sp>
+      <p:sp>
+        <p:nvSpPr>
+          <p:cNvPr id="70" name="PlaceHolder 3"/>
           <p:cNvSpPr>
             <a:spLocks noGrp="1"/>
           </p:cNvSpPr>
@@ -1791,8 +1684,8 @@
         </p:nvSpPr>
         <p:spPr>
           <a:xfrm>
-            <a:off x="6226200" y="1949400"/>
-            <a:ext cx="5131080" cy="2000880"/>
+            <a:off x="6231960" y="1604520"/>
+            <a:ext cx="5354280" cy="1896840"/>
           </a:xfrm>
           <a:prstGeom prst="rect">
             <a:avLst/>
@@ -1803,18 +1696,15 @@
             <a:normAutofit/>
           </a:bodyPr>
           <a:p>
-            <a:endParaRPr b="0" lang="en-US" sz="2800" spc="-1" strike="noStrike">
-              <a:solidFill>
-                <a:srgbClr val="ffffff"/>
-              </a:solidFill>
-              <a:latin typeface="Avenir Next LT Pro"/>
-            </a:endParaRPr>
-          </a:p>
-        </p:txBody>
-      </p:sp>
-      <p:sp>
-        <p:nvSpPr>
-          <p:cNvPr id="77" name="PlaceHolder 4"/>
+            <a:endParaRPr b="0" lang="en-US" sz="3200" spc="-1" strike="noStrike">
+              <a:latin typeface="Arial"/>
+            </a:endParaRPr>
+          </a:p>
+        </p:txBody>
+      </p:sp>
+      <p:sp>
+        <p:nvSpPr>
+          <p:cNvPr id="71" name="PlaceHolder 4"/>
           <p:cNvSpPr>
             <a:spLocks noGrp="1"/>
           </p:cNvSpPr>
@@ -1824,8 +1714,8 @@
         </p:nvSpPr>
         <p:spPr>
           <a:xfrm>
-            <a:off x="838080" y="4140720"/>
-            <a:ext cx="5131080" cy="2000880"/>
+            <a:off x="609480" y="3682080"/>
+            <a:ext cx="5354280" cy="1896840"/>
           </a:xfrm>
           <a:prstGeom prst="rect">
             <a:avLst/>
@@ -1836,18 +1726,15 @@
             <a:normAutofit/>
           </a:bodyPr>
           <a:p>
-            <a:endParaRPr b="0" lang="en-US" sz="2800" spc="-1" strike="noStrike">
-              <a:solidFill>
-                <a:srgbClr val="ffffff"/>
-              </a:solidFill>
-              <a:latin typeface="Avenir Next LT Pro"/>
-            </a:endParaRPr>
-          </a:p>
-        </p:txBody>
-      </p:sp>
-      <p:sp>
-        <p:nvSpPr>
-          <p:cNvPr id="78" name="PlaceHolder 5"/>
+            <a:endParaRPr b="0" lang="en-US" sz="3200" spc="-1" strike="noStrike">
+              <a:latin typeface="Arial"/>
+            </a:endParaRPr>
+          </a:p>
+        </p:txBody>
+      </p:sp>
+      <p:sp>
+        <p:nvSpPr>
+          <p:cNvPr id="72" name="PlaceHolder 5"/>
           <p:cNvSpPr>
             <a:spLocks noGrp="1"/>
           </p:cNvSpPr>
@@ -1857,8 +1744,8 @@
         </p:nvSpPr>
         <p:spPr>
           <a:xfrm>
-            <a:off x="6226200" y="4140720"/>
-            <a:ext cx="5131080" cy="2000880"/>
+            <a:off x="6231960" y="3682080"/>
+            <a:ext cx="5354280" cy="1896840"/>
           </a:xfrm>
           <a:prstGeom prst="rect">
             <a:avLst/>
@@ -1869,11 +1756,8 @@
             <a:normAutofit/>
           </a:bodyPr>
           <a:p>
-            <a:endParaRPr b="0" lang="en-US" sz="2800" spc="-1" strike="noStrike">
-              <a:solidFill>
-                <a:srgbClr val="ffffff"/>
-              </a:solidFill>
-              <a:latin typeface="Avenir Next LT Pro"/>
+            <a:endParaRPr b="0" lang="en-US" sz="3200" spc="-1" strike="noStrike">
+              <a:latin typeface="Arial"/>
             </a:endParaRPr>
           </a:p>
         </p:txBody>
@@ -1902,7 +1786,7 @@
       </p:grpSpPr>
       <p:sp>
         <p:nvSpPr>
-          <p:cNvPr id="79" name="PlaceHolder 1"/>
+          <p:cNvPr id="73" name="PlaceHolder 1"/>
           <p:cNvSpPr>
             <a:spLocks noGrp="1"/>
           </p:cNvSpPr>
@@ -1912,8 +1796,8 @@
         </p:nvSpPr>
         <p:spPr>
           <a:xfrm>
-            <a:off x="838080" y="365760"/>
-            <a:ext cx="10515240" cy="1325160"/>
+            <a:off x="609480" y="273600"/>
+            <a:ext cx="10972440" cy="1144800"/>
           </a:xfrm>
           <a:prstGeom prst="rect">
             <a:avLst/>
@@ -1924,18 +1808,16 @@
             <a:noAutofit/>
           </a:bodyPr>
           <a:p>
-            <a:endParaRPr b="0" lang="en-US" sz="1800" spc="-1" strike="noStrike">
-              <a:solidFill>
-                <a:srgbClr val="000000"/>
-              </a:solidFill>
-              <a:latin typeface="Avenir Next LT Pro"/>
-            </a:endParaRPr>
-          </a:p>
-        </p:txBody>
-      </p:sp>
-      <p:sp>
-        <p:nvSpPr>
-          <p:cNvPr id="80" name="PlaceHolder 2"/>
+            <a:pPr algn="ctr"/>
+            <a:endParaRPr b="0" lang="en-US" sz="4400" spc="-1" strike="noStrike">
+              <a:latin typeface="Arial"/>
+            </a:endParaRPr>
+          </a:p>
+        </p:txBody>
+      </p:sp>
+      <p:sp>
+        <p:nvSpPr>
+          <p:cNvPr id="74" name="PlaceHolder 2"/>
           <p:cNvSpPr>
             <a:spLocks noGrp="1"/>
           </p:cNvSpPr>
@@ -1945,8 +1827,8 @@
         </p:nvSpPr>
         <p:spPr>
           <a:xfrm>
-            <a:off x="838080" y="1949400"/>
-            <a:ext cx="3385800" cy="2000880"/>
+            <a:off x="609480" y="1604520"/>
+            <a:ext cx="3533040" cy="1896840"/>
           </a:xfrm>
           <a:prstGeom prst="rect">
             <a:avLst/>
@@ -1957,18 +1839,15 @@
             <a:normAutofit/>
           </a:bodyPr>
           <a:p>
-            <a:endParaRPr b="0" lang="en-US" sz="2800" spc="-1" strike="noStrike">
-              <a:solidFill>
-                <a:srgbClr val="ffffff"/>
-              </a:solidFill>
-              <a:latin typeface="Avenir Next LT Pro"/>
-            </a:endParaRPr>
-          </a:p>
-        </p:txBody>
-      </p:sp>
-      <p:sp>
-        <p:nvSpPr>
-          <p:cNvPr id="81" name="PlaceHolder 3"/>
+            <a:endParaRPr b="0" lang="en-US" sz="3200" spc="-1" strike="noStrike">
+              <a:latin typeface="Arial"/>
+            </a:endParaRPr>
+          </a:p>
+        </p:txBody>
+      </p:sp>
+      <p:sp>
+        <p:nvSpPr>
+          <p:cNvPr id="75" name="PlaceHolder 3"/>
           <p:cNvSpPr>
             <a:spLocks noGrp="1"/>
           </p:cNvSpPr>
@@ -1978,8 +1857,8 @@
         </p:nvSpPr>
         <p:spPr>
           <a:xfrm>
-            <a:off x="4393440" y="1949400"/>
-            <a:ext cx="3385800" cy="2000880"/>
+            <a:off x="4319640" y="1604520"/>
+            <a:ext cx="3533040" cy="1896840"/>
           </a:xfrm>
           <a:prstGeom prst="rect">
             <a:avLst/>
@@ -1990,18 +1869,15 @@
             <a:normAutofit/>
           </a:bodyPr>
           <a:p>
-            <a:endParaRPr b="0" lang="en-US" sz="2800" spc="-1" strike="noStrike">
-              <a:solidFill>
-                <a:srgbClr val="ffffff"/>
-              </a:solidFill>
-              <a:latin typeface="Avenir Next LT Pro"/>
-            </a:endParaRPr>
-          </a:p>
-        </p:txBody>
-      </p:sp>
-      <p:sp>
-        <p:nvSpPr>
-          <p:cNvPr id="82" name="PlaceHolder 4"/>
+            <a:endParaRPr b="0" lang="en-US" sz="3200" spc="-1" strike="noStrike">
+              <a:latin typeface="Arial"/>
+            </a:endParaRPr>
+          </a:p>
+        </p:txBody>
+      </p:sp>
+      <p:sp>
+        <p:nvSpPr>
+          <p:cNvPr id="76" name="PlaceHolder 4"/>
           <p:cNvSpPr>
             <a:spLocks noGrp="1"/>
           </p:cNvSpPr>
@@ -2011,8 +1887,8 @@
         </p:nvSpPr>
         <p:spPr>
           <a:xfrm>
-            <a:off x="7949160" y="1949400"/>
-            <a:ext cx="3385800" cy="2000880"/>
+            <a:off x="8029800" y="1604520"/>
+            <a:ext cx="3533040" cy="1896840"/>
           </a:xfrm>
           <a:prstGeom prst="rect">
             <a:avLst/>
@@ -2023,18 +1899,15 @@
             <a:normAutofit/>
           </a:bodyPr>
           <a:p>
-            <a:endParaRPr b="0" lang="en-US" sz="2800" spc="-1" strike="noStrike">
-              <a:solidFill>
-                <a:srgbClr val="ffffff"/>
-              </a:solidFill>
-              <a:latin typeface="Avenir Next LT Pro"/>
-            </a:endParaRPr>
-          </a:p>
-        </p:txBody>
-      </p:sp>
-      <p:sp>
-        <p:nvSpPr>
-          <p:cNvPr id="83" name="PlaceHolder 5"/>
+            <a:endParaRPr b="0" lang="en-US" sz="3200" spc="-1" strike="noStrike">
+              <a:latin typeface="Arial"/>
+            </a:endParaRPr>
+          </a:p>
+        </p:txBody>
+      </p:sp>
+      <p:sp>
+        <p:nvSpPr>
+          <p:cNvPr id="77" name="PlaceHolder 5"/>
           <p:cNvSpPr>
             <a:spLocks noGrp="1"/>
           </p:cNvSpPr>
@@ -2044,8 +1917,8 @@
         </p:nvSpPr>
         <p:spPr>
           <a:xfrm>
-            <a:off x="838080" y="4140720"/>
-            <a:ext cx="3385800" cy="2000880"/>
+            <a:off x="609480" y="3682080"/>
+            <a:ext cx="3533040" cy="1896840"/>
           </a:xfrm>
           <a:prstGeom prst="rect">
             <a:avLst/>
@@ -2056,18 +1929,15 @@
             <a:normAutofit/>
           </a:bodyPr>
           <a:p>
-            <a:endParaRPr b="0" lang="en-US" sz="2800" spc="-1" strike="noStrike">
-              <a:solidFill>
-                <a:srgbClr val="ffffff"/>
-              </a:solidFill>
-              <a:latin typeface="Avenir Next LT Pro"/>
-            </a:endParaRPr>
-          </a:p>
-        </p:txBody>
-      </p:sp>
-      <p:sp>
-        <p:nvSpPr>
-          <p:cNvPr id="84" name="PlaceHolder 6"/>
+            <a:endParaRPr b="0" lang="en-US" sz="3200" spc="-1" strike="noStrike">
+              <a:latin typeface="Arial"/>
+            </a:endParaRPr>
+          </a:p>
+        </p:txBody>
+      </p:sp>
+      <p:sp>
+        <p:nvSpPr>
+          <p:cNvPr id="78" name="PlaceHolder 6"/>
           <p:cNvSpPr>
             <a:spLocks noGrp="1"/>
           </p:cNvSpPr>
@@ -2077,8 +1947,8 @@
         </p:nvSpPr>
         <p:spPr>
           <a:xfrm>
-            <a:off x="4393440" y="4140720"/>
-            <a:ext cx="3385800" cy="2000880"/>
+            <a:off x="4319640" y="3682080"/>
+            <a:ext cx="3533040" cy="1896840"/>
           </a:xfrm>
           <a:prstGeom prst="rect">
             <a:avLst/>
@@ -2089,18 +1959,15 @@
             <a:normAutofit/>
           </a:bodyPr>
           <a:p>
-            <a:endParaRPr b="0" lang="en-US" sz="2800" spc="-1" strike="noStrike">
-              <a:solidFill>
-                <a:srgbClr val="ffffff"/>
-              </a:solidFill>
-              <a:latin typeface="Avenir Next LT Pro"/>
-            </a:endParaRPr>
-          </a:p>
-        </p:txBody>
-      </p:sp>
-      <p:sp>
-        <p:nvSpPr>
-          <p:cNvPr id="85" name="PlaceHolder 7"/>
+            <a:endParaRPr b="0" lang="en-US" sz="3200" spc="-1" strike="noStrike">
+              <a:latin typeface="Arial"/>
+            </a:endParaRPr>
+          </a:p>
+        </p:txBody>
+      </p:sp>
+      <p:sp>
+        <p:nvSpPr>
+          <p:cNvPr id="79" name="PlaceHolder 7"/>
           <p:cNvSpPr>
             <a:spLocks noGrp="1"/>
           </p:cNvSpPr>
@@ -2110,8 +1977,8 @@
         </p:nvSpPr>
         <p:spPr>
           <a:xfrm>
-            <a:off x="7949160" y="4140720"/>
-            <a:ext cx="3385800" cy="2000880"/>
+            <a:off x="8029800" y="3682080"/>
+            <a:ext cx="3533040" cy="1896840"/>
           </a:xfrm>
           <a:prstGeom prst="rect">
             <a:avLst/>
@@ -2122,11 +1989,8 @@
             <a:normAutofit/>
           </a:bodyPr>
           <a:p>
-            <a:endParaRPr b="0" lang="en-US" sz="2800" spc="-1" strike="noStrike">
-              <a:solidFill>
-                <a:srgbClr val="ffffff"/>
-              </a:solidFill>
-              <a:latin typeface="Avenir Next LT Pro"/>
+            <a:endParaRPr b="0" lang="en-US" sz="3200" spc="-1" strike="noStrike">
+              <a:latin typeface="Arial"/>
             </a:endParaRPr>
           </a:p>
         </p:txBody>
@@ -2155,7 +2019,7 @@
       </p:grpSpPr>
       <p:sp>
         <p:nvSpPr>
-          <p:cNvPr id="9" name="PlaceHolder 1"/>
+          <p:cNvPr id="6" name="PlaceHolder 1"/>
           <p:cNvSpPr>
             <a:spLocks noGrp="1"/>
           </p:cNvSpPr>
@@ -2165,8 +2029,8 @@
         </p:nvSpPr>
         <p:spPr>
           <a:xfrm>
-            <a:off x="838080" y="365760"/>
-            <a:ext cx="10515240" cy="1325160"/>
+            <a:off x="609480" y="273600"/>
+            <a:ext cx="10972440" cy="1144800"/>
           </a:xfrm>
           <a:prstGeom prst="rect">
             <a:avLst/>
@@ -2177,18 +2041,16 @@
             <a:noAutofit/>
           </a:bodyPr>
           <a:p>
-            <a:endParaRPr b="0" lang="en-US" sz="1800" spc="-1" strike="noStrike">
-              <a:solidFill>
-                <a:srgbClr val="000000"/>
-              </a:solidFill>
-              <a:latin typeface="Avenir Next LT Pro"/>
-            </a:endParaRPr>
-          </a:p>
-        </p:txBody>
-      </p:sp>
-      <p:sp>
-        <p:nvSpPr>
-          <p:cNvPr id="10" name="PlaceHolder 2"/>
+            <a:pPr algn="ctr"/>
+            <a:endParaRPr b="0" lang="en-US" sz="4400" spc="-1" strike="noStrike">
+              <a:latin typeface="Arial"/>
+            </a:endParaRPr>
+          </a:p>
+        </p:txBody>
+      </p:sp>
+      <p:sp>
+        <p:nvSpPr>
+          <p:cNvPr id="7" name="PlaceHolder 2"/>
           <p:cNvSpPr>
             <a:spLocks noGrp="1"/>
           </p:cNvSpPr>
@@ -2198,8 +2060,8 @@
         </p:nvSpPr>
         <p:spPr>
           <a:xfrm>
-            <a:off x="838080" y="1949400"/>
-            <a:ext cx="10515240" cy="4195440"/>
+            <a:off x="609480" y="1604520"/>
+            <a:ext cx="10972440" cy="3977280"/>
           </a:xfrm>
           <a:prstGeom prst="rect">
             <a:avLst/>
@@ -2210,11 +2072,8 @@
             <a:normAutofit/>
           </a:bodyPr>
           <a:p>
-            <a:endParaRPr b="0" lang="en-US" sz="2800" spc="-1" strike="noStrike">
-              <a:solidFill>
-                <a:srgbClr val="ffffff"/>
-              </a:solidFill>
-              <a:latin typeface="Avenir Next LT Pro"/>
+            <a:endParaRPr b="0" lang="en-US" sz="3200" spc="-1" strike="noStrike">
+              <a:latin typeface="Arial"/>
             </a:endParaRPr>
           </a:p>
         </p:txBody>
@@ -2243,7 +2102,7 @@
       </p:grpSpPr>
       <p:sp>
         <p:nvSpPr>
-          <p:cNvPr id="11" name="PlaceHolder 1"/>
+          <p:cNvPr id="8" name="PlaceHolder 1"/>
           <p:cNvSpPr>
             <a:spLocks noGrp="1"/>
           </p:cNvSpPr>
@@ -2253,8 +2112,8 @@
         </p:nvSpPr>
         <p:spPr>
           <a:xfrm>
-            <a:off x="838080" y="365760"/>
-            <a:ext cx="10515240" cy="1325160"/>
+            <a:off x="609480" y="273600"/>
+            <a:ext cx="10972440" cy="1144800"/>
           </a:xfrm>
           <a:prstGeom prst="rect">
             <a:avLst/>
@@ -2265,18 +2124,16 @@
             <a:noAutofit/>
           </a:bodyPr>
           <a:p>
-            <a:endParaRPr b="0" lang="en-US" sz="1800" spc="-1" strike="noStrike">
-              <a:solidFill>
-                <a:srgbClr val="000000"/>
-              </a:solidFill>
-              <a:latin typeface="Avenir Next LT Pro"/>
-            </a:endParaRPr>
-          </a:p>
-        </p:txBody>
-      </p:sp>
-      <p:sp>
-        <p:nvSpPr>
-          <p:cNvPr id="12" name="PlaceHolder 2"/>
+            <a:pPr algn="ctr"/>
+            <a:endParaRPr b="0" lang="en-US" sz="4400" spc="-1" strike="noStrike">
+              <a:latin typeface="Arial"/>
+            </a:endParaRPr>
+          </a:p>
+        </p:txBody>
+      </p:sp>
+      <p:sp>
+        <p:nvSpPr>
+          <p:cNvPr id="9" name="PlaceHolder 2"/>
           <p:cNvSpPr>
             <a:spLocks noGrp="1"/>
           </p:cNvSpPr>
@@ -2286,8 +2143,8 @@
         </p:nvSpPr>
         <p:spPr>
           <a:xfrm>
-            <a:off x="838080" y="1949400"/>
-            <a:ext cx="5131080" cy="4195440"/>
+            <a:off x="609480" y="1604520"/>
+            <a:ext cx="5354280" cy="3977280"/>
           </a:xfrm>
           <a:prstGeom prst="rect">
             <a:avLst/>
@@ -2298,18 +2155,15 @@
             <a:normAutofit/>
           </a:bodyPr>
           <a:p>
-            <a:endParaRPr b="0" lang="en-US" sz="2800" spc="-1" strike="noStrike">
-              <a:solidFill>
-                <a:srgbClr val="ffffff"/>
-              </a:solidFill>
-              <a:latin typeface="Avenir Next LT Pro"/>
-            </a:endParaRPr>
-          </a:p>
-        </p:txBody>
-      </p:sp>
-      <p:sp>
-        <p:nvSpPr>
-          <p:cNvPr id="13" name="PlaceHolder 3"/>
+            <a:endParaRPr b="0" lang="en-US" sz="3200" spc="-1" strike="noStrike">
+              <a:latin typeface="Arial"/>
+            </a:endParaRPr>
+          </a:p>
+        </p:txBody>
+      </p:sp>
+      <p:sp>
+        <p:nvSpPr>
+          <p:cNvPr id="10" name="PlaceHolder 3"/>
           <p:cNvSpPr>
             <a:spLocks noGrp="1"/>
           </p:cNvSpPr>
@@ -2319,8 +2173,8 @@
         </p:nvSpPr>
         <p:spPr>
           <a:xfrm>
-            <a:off x="6226200" y="1949400"/>
-            <a:ext cx="5131080" cy="4195440"/>
+            <a:off x="6231960" y="1604520"/>
+            <a:ext cx="5354280" cy="3977280"/>
           </a:xfrm>
           <a:prstGeom prst="rect">
             <a:avLst/>
@@ -2331,11 +2185,8 @@
             <a:normAutofit/>
           </a:bodyPr>
           <a:p>
-            <a:endParaRPr b="0" lang="en-US" sz="2800" spc="-1" strike="noStrike">
-              <a:solidFill>
-                <a:srgbClr val="ffffff"/>
-              </a:solidFill>
-              <a:latin typeface="Avenir Next LT Pro"/>
+            <a:endParaRPr b="0" lang="en-US" sz="3200" spc="-1" strike="noStrike">
+              <a:latin typeface="Arial"/>
             </a:endParaRPr>
           </a:p>
         </p:txBody>
@@ -2364,7 +2215,7 @@
       </p:grpSpPr>
       <p:sp>
         <p:nvSpPr>
-          <p:cNvPr id="14" name="PlaceHolder 1"/>
+          <p:cNvPr id="11" name="PlaceHolder 1"/>
           <p:cNvSpPr>
             <a:spLocks noGrp="1"/>
           </p:cNvSpPr>
@@ -2374,8 +2225,8 @@
         </p:nvSpPr>
         <p:spPr>
           <a:xfrm>
-            <a:off x="838080" y="365760"/>
-            <a:ext cx="10515240" cy="1325160"/>
+            <a:off x="609480" y="273600"/>
+            <a:ext cx="10972440" cy="1144800"/>
           </a:xfrm>
           <a:prstGeom prst="rect">
             <a:avLst/>
@@ -2386,11 +2237,9 @@
             <a:noAutofit/>
           </a:bodyPr>
           <a:p>
-            <a:endParaRPr b="0" lang="en-US" sz="1800" spc="-1" strike="noStrike">
-              <a:solidFill>
-                <a:srgbClr val="000000"/>
-              </a:solidFill>
-              <a:latin typeface="Avenir Next LT Pro"/>
+            <a:pPr algn="ctr"/>
+            <a:endParaRPr b="0" lang="en-US" sz="4400" spc="-1" strike="noStrike">
+              <a:latin typeface="Arial"/>
             </a:endParaRPr>
           </a:p>
         </p:txBody>
@@ -2419,7 +2268,7 @@
       </p:grpSpPr>
       <p:sp>
         <p:nvSpPr>
-          <p:cNvPr id="15" name="PlaceHolder 1"/>
+          <p:cNvPr id="12" name="PlaceHolder 1"/>
           <p:cNvSpPr>
             <a:spLocks noGrp="1"/>
           </p:cNvSpPr>
@@ -2429,8 +2278,8 @@
         </p:nvSpPr>
         <p:spPr>
           <a:xfrm>
-            <a:off x="838080" y="365760"/>
-            <a:ext cx="10515240" cy="6144120"/>
+            <a:off x="609480" y="273600"/>
+            <a:ext cx="10972440" cy="5307840"/>
           </a:xfrm>
           <a:prstGeom prst="rect">
             <a:avLst/>
@@ -2472,7 +2321,7 @@
       </p:grpSpPr>
       <p:sp>
         <p:nvSpPr>
-          <p:cNvPr id="16" name="PlaceHolder 1"/>
+          <p:cNvPr id="13" name="PlaceHolder 1"/>
           <p:cNvSpPr>
             <a:spLocks noGrp="1"/>
           </p:cNvSpPr>
@@ -2482,8 +2331,8 @@
         </p:nvSpPr>
         <p:spPr>
           <a:xfrm>
-            <a:off x="838080" y="365760"/>
-            <a:ext cx="10515240" cy="1325160"/>
+            <a:off x="609480" y="273600"/>
+            <a:ext cx="10972440" cy="1144800"/>
           </a:xfrm>
           <a:prstGeom prst="rect">
             <a:avLst/>
@@ -2494,18 +2343,16 @@
             <a:noAutofit/>
           </a:bodyPr>
           <a:p>
-            <a:endParaRPr b="0" lang="en-US" sz="1800" spc="-1" strike="noStrike">
-              <a:solidFill>
-                <a:srgbClr val="000000"/>
-              </a:solidFill>
-              <a:latin typeface="Avenir Next LT Pro"/>
-            </a:endParaRPr>
-          </a:p>
-        </p:txBody>
-      </p:sp>
-      <p:sp>
-        <p:nvSpPr>
-          <p:cNvPr id="17" name="PlaceHolder 2"/>
+            <a:pPr algn="ctr"/>
+            <a:endParaRPr b="0" lang="en-US" sz="4400" spc="-1" strike="noStrike">
+              <a:latin typeface="Arial"/>
+            </a:endParaRPr>
+          </a:p>
+        </p:txBody>
+      </p:sp>
+      <p:sp>
+        <p:nvSpPr>
+          <p:cNvPr id="14" name="PlaceHolder 2"/>
           <p:cNvSpPr>
             <a:spLocks noGrp="1"/>
           </p:cNvSpPr>
@@ -2515,8 +2362,8 @@
         </p:nvSpPr>
         <p:spPr>
           <a:xfrm>
-            <a:off x="838080" y="1949400"/>
-            <a:ext cx="5131080" cy="2000880"/>
+            <a:off x="609480" y="1604520"/>
+            <a:ext cx="5354280" cy="1896840"/>
           </a:xfrm>
           <a:prstGeom prst="rect">
             <a:avLst/>
@@ -2527,18 +2374,15 @@
             <a:normAutofit/>
           </a:bodyPr>
           <a:p>
-            <a:endParaRPr b="0" lang="en-US" sz="2800" spc="-1" strike="noStrike">
-              <a:solidFill>
-                <a:srgbClr val="ffffff"/>
-              </a:solidFill>
-              <a:latin typeface="Avenir Next LT Pro"/>
-            </a:endParaRPr>
-          </a:p>
-        </p:txBody>
-      </p:sp>
-      <p:sp>
-        <p:nvSpPr>
-          <p:cNvPr id="18" name="PlaceHolder 3"/>
+            <a:endParaRPr b="0" lang="en-US" sz="3200" spc="-1" strike="noStrike">
+              <a:latin typeface="Arial"/>
+            </a:endParaRPr>
+          </a:p>
+        </p:txBody>
+      </p:sp>
+      <p:sp>
+        <p:nvSpPr>
+          <p:cNvPr id="15" name="PlaceHolder 3"/>
           <p:cNvSpPr>
             <a:spLocks noGrp="1"/>
           </p:cNvSpPr>
@@ -2548,8 +2392,8 @@
         </p:nvSpPr>
         <p:spPr>
           <a:xfrm>
-            <a:off x="6226200" y="1949400"/>
-            <a:ext cx="5131080" cy="4195440"/>
+            <a:off x="6231960" y="1604520"/>
+            <a:ext cx="5354280" cy="3977280"/>
           </a:xfrm>
           <a:prstGeom prst="rect">
             <a:avLst/>
@@ -2560,18 +2404,15 @@
             <a:normAutofit/>
           </a:bodyPr>
           <a:p>
-            <a:endParaRPr b="0" lang="en-US" sz="2800" spc="-1" strike="noStrike">
-              <a:solidFill>
-                <a:srgbClr val="ffffff"/>
-              </a:solidFill>
-              <a:latin typeface="Avenir Next LT Pro"/>
-            </a:endParaRPr>
-          </a:p>
-        </p:txBody>
-      </p:sp>
-      <p:sp>
-        <p:nvSpPr>
-          <p:cNvPr id="19" name="PlaceHolder 4"/>
+            <a:endParaRPr b="0" lang="en-US" sz="3200" spc="-1" strike="noStrike">
+              <a:latin typeface="Arial"/>
+            </a:endParaRPr>
+          </a:p>
+        </p:txBody>
+      </p:sp>
+      <p:sp>
+        <p:nvSpPr>
+          <p:cNvPr id="16" name="PlaceHolder 4"/>
           <p:cNvSpPr>
             <a:spLocks noGrp="1"/>
           </p:cNvSpPr>
@@ -2581,8 +2422,8 @@
         </p:nvSpPr>
         <p:spPr>
           <a:xfrm>
-            <a:off x="838080" y="4140720"/>
-            <a:ext cx="5131080" cy="2000880"/>
+            <a:off x="609480" y="3682080"/>
+            <a:ext cx="5354280" cy="1896840"/>
           </a:xfrm>
           <a:prstGeom prst="rect">
             <a:avLst/>
@@ -2593,11 +2434,8 @@
             <a:normAutofit/>
           </a:bodyPr>
           <a:p>
-            <a:endParaRPr b="0" lang="en-US" sz="2800" spc="-1" strike="noStrike">
-              <a:solidFill>
-                <a:srgbClr val="ffffff"/>
-              </a:solidFill>
-              <a:latin typeface="Avenir Next LT Pro"/>
+            <a:endParaRPr b="0" lang="en-US" sz="3200" spc="-1" strike="noStrike">
+              <a:latin typeface="Arial"/>
             </a:endParaRPr>
           </a:p>
         </p:txBody>
@@ -2626,7 +2464,7 @@
       </p:grpSpPr>
       <p:sp>
         <p:nvSpPr>
-          <p:cNvPr id="20" name="PlaceHolder 1"/>
+          <p:cNvPr id="17" name="PlaceHolder 1"/>
           <p:cNvSpPr>
             <a:spLocks noGrp="1"/>
           </p:cNvSpPr>
@@ -2636,8 +2474,8 @@
         </p:nvSpPr>
         <p:spPr>
           <a:xfrm>
-            <a:off x="838080" y="365760"/>
-            <a:ext cx="10515240" cy="1325160"/>
+            <a:off x="609480" y="273600"/>
+            <a:ext cx="10972440" cy="1144800"/>
           </a:xfrm>
           <a:prstGeom prst="rect">
             <a:avLst/>
@@ -2648,18 +2486,16 @@
             <a:noAutofit/>
           </a:bodyPr>
           <a:p>
-            <a:endParaRPr b="0" lang="en-US" sz="1800" spc="-1" strike="noStrike">
-              <a:solidFill>
-                <a:srgbClr val="000000"/>
-              </a:solidFill>
-              <a:latin typeface="Avenir Next LT Pro"/>
-            </a:endParaRPr>
-          </a:p>
-        </p:txBody>
-      </p:sp>
-      <p:sp>
-        <p:nvSpPr>
-          <p:cNvPr id="21" name="PlaceHolder 2"/>
+            <a:pPr algn="ctr"/>
+            <a:endParaRPr b="0" lang="en-US" sz="4400" spc="-1" strike="noStrike">
+              <a:latin typeface="Arial"/>
+            </a:endParaRPr>
+          </a:p>
+        </p:txBody>
+      </p:sp>
+      <p:sp>
+        <p:nvSpPr>
+          <p:cNvPr id="18" name="PlaceHolder 2"/>
           <p:cNvSpPr>
             <a:spLocks noGrp="1"/>
           </p:cNvSpPr>
@@ -2669,8 +2505,8 @@
         </p:nvSpPr>
         <p:spPr>
           <a:xfrm>
-            <a:off x="838080" y="1949400"/>
-            <a:ext cx="5131080" cy="4195440"/>
+            <a:off x="609480" y="1604520"/>
+            <a:ext cx="5354280" cy="3977280"/>
           </a:xfrm>
           <a:prstGeom prst="rect">
             <a:avLst/>
@@ -2681,18 +2517,15 @@
             <a:normAutofit/>
           </a:bodyPr>
           <a:p>
-            <a:endParaRPr b="0" lang="en-US" sz="2800" spc="-1" strike="noStrike">
-              <a:solidFill>
-                <a:srgbClr val="ffffff"/>
-              </a:solidFill>
-              <a:latin typeface="Avenir Next LT Pro"/>
-            </a:endParaRPr>
-          </a:p>
-        </p:txBody>
-      </p:sp>
-      <p:sp>
-        <p:nvSpPr>
-          <p:cNvPr id="22" name="PlaceHolder 3"/>
+            <a:endParaRPr b="0" lang="en-US" sz="3200" spc="-1" strike="noStrike">
+              <a:latin typeface="Arial"/>
+            </a:endParaRPr>
+          </a:p>
+        </p:txBody>
+      </p:sp>
+      <p:sp>
+        <p:nvSpPr>
+          <p:cNvPr id="19" name="PlaceHolder 3"/>
           <p:cNvSpPr>
             <a:spLocks noGrp="1"/>
           </p:cNvSpPr>
@@ -2702,8 +2535,8 @@
         </p:nvSpPr>
         <p:spPr>
           <a:xfrm>
-            <a:off x="6226200" y="1949400"/>
-            <a:ext cx="5131080" cy="2000880"/>
+            <a:off x="6231960" y="1604520"/>
+            <a:ext cx="5354280" cy="1896840"/>
           </a:xfrm>
           <a:prstGeom prst="rect">
             <a:avLst/>
@@ -2714,18 +2547,15 @@
             <a:normAutofit/>
           </a:bodyPr>
           <a:p>
-            <a:endParaRPr b="0" lang="en-US" sz="2800" spc="-1" strike="noStrike">
-              <a:solidFill>
-                <a:srgbClr val="ffffff"/>
-              </a:solidFill>
-              <a:latin typeface="Avenir Next LT Pro"/>
-            </a:endParaRPr>
-          </a:p>
-        </p:txBody>
-      </p:sp>
-      <p:sp>
-        <p:nvSpPr>
-          <p:cNvPr id="23" name="PlaceHolder 4"/>
+            <a:endParaRPr b="0" lang="en-US" sz="3200" spc="-1" strike="noStrike">
+              <a:latin typeface="Arial"/>
+            </a:endParaRPr>
+          </a:p>
+        </p:txBody>
+      </p:sp>
+      <p:sp>
+        <p:nvSpPr>
+          <p:cNvPr id="20" name="PlaceHolder 4"/>
           <p:cNvSpPr>
             <a:spLocks noGrp="1"/>
           </p:cNvSpPr>
@@ -2735,8 +2565,8 @@
         </p:nvSpPr>
         <p:spPr>
           <a:xfrm>
-            <a:off x="6226200" y="4140720"/>
-            <a:ext cx="5131080" cy="2000880"/>
+            <a:off x="6231960" y="3682080"/>
+            <a:ext cx="5354280" cy="1896840"/>
           </a:xfrm>
           <a:prstGeom prst="rect">
             <a:avLst/>
@@ -2747,11 +2577,8 @@
             <a:normAutofit/>
           </a:bodyPr>
           <a:p>
-            <a:endParaRPr b="0" lang="en-US" sz="2800" spc="-1" strike="noStrike">
-              <a:solidFill>
-                <a:srgbClr val="ffffff"/>
-              </a:solidFill>
-              <a:latin typeface="Avenir Next LT Pro"/>
+            <a:endParaRPr b="0" lang="en-US" sz="3200" spc="-1" strike="noStrike">
+              <a:latin typeface="Arial"/>
             </a:endParaRPr>
           </a:p>
         </p:txBody>
@@ -2780,7 +2607,7 @@
       </p:grpSpPr>
       <p:sp>
         <p:nvSpPr>
-          <p:cNvPr id="24" name="PlaceHolder 1"/>
+          <p:cNvPr id="21" name="PlaceHolder 1"/>
           <p:cNvSpPr>
             <a:spLocks noGrp="1"/>
           </p:cNvSpPr>
@@ -2790,8 +2617,8 @@
         </p:nvSpPr>
         <p:spPr>
           <a:xfrm>
-            <a:off x="838080" y="365760"/>
-            <a:ext cx="10515240" cy="1325160"/>
+            <a:off x="609480" y="273600"/>
+            <a:ext cx="10972440" cy="1144800"/>
           </a:xfrm>
           <a:prstGeom prst="rect">
             <a:avLst/>
@@ -2802,18 +2629,16 @@
             <a:noAutofit/>
           </a:bodyPr>
           <a:p>
-            <a:endParaRPr b="0" lang="en-US" sz="1800" spc="-1" strike="noStrike">
-              <a:solidFill>
-                <a:srgbClr val="000000"/>
-              </a:solidFill>
-              <a:latin typeface="Avenir Next LT Pro"/>
-            </a:endParaRPr>
-          </a:p>
-        </p:txBody>
-      </p:sp>
-      <p:sp>
-        <p:nvSpPr>
-          <p:cNvPr id="25" name="PlaceHolder 2"/>
+            <a:pPr algn="ctr"/>
+            <a:endParaRPr b="0" lang="en-US" sz="4400" spc="-1" strike="noStrike">
+              <a:latin typeface="Arial"/>
+            </a:endParaRPr>
+          </a:p>
+        </p:txBody>
+      </p:sp>
+      <p:sp>
+        <p:nvSpPr>
+          <p:cNvPr id="22" name="PlaceHolder 2"/>
           <p:cNvSpPr>
             <a:spLocks noGrp="1"/>
           </p:cNvSpPr>
@@ -2823,8 +2648,8 @@
         </p:nvSpPr>
         <p:spPr>
           <a:xfrm>
-            <a:off x="838080" y="1949400"/>
-            <a:ext cx="5131080" cy="2000880"/>
+            <a:off x="609480" y="1604520"/>
+            <a:ext cx="5354280" cy="1896840"/>
           </a:xfrm>
           <a:prstGeom prst="rect">
             <a:avLst/>
@@ -2835,18 +2660,15 @@
             <a:normAutofit/>
           </a:bodyPr>
           <a:p>
-            <a:endParaRPr b="0" lang="en-US" sz="2800" spc="-1" strike="noStrike">
-              <a:solidFill>
-                <a:srgbClr val="ffffff"/>
-              </a:solidFill>
-              <a:latin typeface="Avenir Next LT Pro"/>
-            </a:endParaRPr>
-          </a:p>
-        </p:txBody>
-      </p:sp>
-      <p:sp>
-        <p:nvSpPr>
-          <p:cNvPr id="26" name="PlaceHolder 3"/>
+            <a:endParaRPr b="0" lang="en-US" sz="3200" spc="-1" strike="noStrike">
+              <a:latin typeface="Arial"/>
+            </a:endParaRPr>
+          </a:p>
+        </p:txBody>
+      </p:sp>
+      <p:sp>
+        <p:nvSpPr>
+          <p:cNvPr id="23" name="PlaceHolder 3"/>
           <p:cNvSpPr>
             <a:spLocks noGrp="1"/>
           </p:cNvSpPr>
@@ -2856,8 +2678,8 @@
         </p:nvSpPr>
         <p:spPr>
           <a:xfrm>
-            <a:off x="6226200" y="1949400"/>
-            <a:ext cx="5131080" cy="2000880"/>
+            <a:off x="6231960" y="1604520"/>
+            <a:ext cx="5354280" cy="1896840"/>
           </a:xfrm>
           <a:prstGeom prst="rect">
             <a:avLst/>
@@ -2868,18 +2690,15 @@
             <a:normAutofit/>
           </a:bodyPr>
           <a:p>
-            <a:endParaRPr b="0" lang="en-US" sz="2800" spc="-1" strike="noStrike">
-              <a:solidFill>
-                <a:srgbClr val="ffffff"/>
-              </a:solidFill>
-              <a:latin typeface="Avenir Next LT Pro"/>
-            </a:endParaRPr>
-          </a:p>
-        </p:txBody>
-      </p:sp>
-      <p:sp>
-        <p:nvSpPr>
-          <p:cNvPr id="27" name="PlaceHolder 4"/>
+            <a:endParaRPr b="0" lang="en-US" sz="3200" spc="-1" strike="noStrike">
+              <a:latin typeface="Arial"/>
+            </a:endParaRPr>
+          </a:p>
+        </p:txBody>
+      </p:sp>
+      <p:sp>
+        <p:nvSpPr>
+          <p:cNvPr id="24" name="PlaceHolder 4"/>
           <p:cNvSpPr>
             <a:spLocks noGrp="1"/>
           </p:cNvSpPr>
@@ -2889,8 +2708,8 @@
         </p:nvSpPr>
         <p:spPr>
           <a:xfrm>
-            <a:off x="838080" y="4140720"/>
-            <a:ext cx="10515240" cy="2000880"/>
+            <a:off x="609480" y="3682080"/>
+            <a:ext cx="10972440" cy="1896840"/>
           </a:xfrm>
           <a:prstGeom prst="rect">
             <a:avLst/>
@@ -2901,11 +2720,8 @@
             <a:normAutofit/>
           </a:bodyPr>
           <a:p>
-            <a:endParaRPr b="0" lang="en-US" sz="2800" spc="-1" strike="noStrike">
-              <a:solidFill>
-                <a:srgbClr val="ffffff"/>
-              </a:solidFill>
-              <a:latin typeface="Avenir Next LT Pro"/>
+            <a:endParaRPr b="0" lang="en-US" sz="3200" spc="-1" strike="noStrike">
+              <a:latin typeface="Arial"/>
             </a:endParaRPr>
           </a:p>
         </p:txBody>
@@ -2948,7 +2764,7 @@
         <p:spPr>
           <a:xfrm>
             <a:off x="0" y="0"/>
-            <a:ext cx="12191760" cy="6857640"/>
+            <a:ext cx="12191400" cy="6857280"/>
           </a:xfrm>
           <a:prstGeom prst="rect">
             <a:avLst/>
@@ -2993,7 +2809,7 @@
         <p:spPr>
           <a:xfrm>
             <a:off x="0" y="0"/>
-            <a:ext cx="12191760" cy="1392120"/>
+            <a:ext cx="12191400" cy="1391760"/>
           </a:xfrm>
           <a:prstGeom prst="rect">
             <a:avLst/>
@@ -3015,37 +2831,26 @@
         </p:nvSpPr>
         <p:spPr>
           <a:xfrm>
-            <a:off x="1523880" y="1122480"/>
-            <a:ext cx="9143640" cy="2387160"/>
-          </a:xfrm>
-          <a:prstGeom prst="rect">
-            <a:avLst/>
-          </a:prstGeom>
-        </p:spPr>
-        <p:txBody>
-          <a:bodyPr anchor="b">
+            <a:off x="838080" y="365760"/>
+            <a:ext cx="10514880" cy="1324800"/>
+          </a:xfrm>
+          <a:prstGeom prst="rect">
+            <a:avLst/>
+          </a:prstGeom>
+        </p:spPr>
+        <p:txBody>
+          <a:bodyPr lIns="0" rIns="0" tIns="0" bIns="0" anchor="ctr">
             <a:noAutofit/>
           </a:bodyPr>
           <a:p>
-            <a:pPr algn="ctr">
-              <a:lnSpc>
-                <a:spcPct val="100000"/>
-              </a:lnSpc>
-            </a:pPr>
             <a:r>
-              <a:rPr b="1" lang="en-US" sz="4400" spc="-1" strike="noStrike">
-                <a:solidFill>
-                  <a:srgbClr val="ffffff"/>
-                </a:solidFill>
-                <a:latin typeface="Avenir Next LT Pro"/>
+              <a:rPr b="0" lang="en-US" sz="1800" spc="-1" strike="noStrike">
+                <a:latin typeface="Arial"/>
               </a:rPr>
-              <a:t>Click to edit Master title style</a:t>
+              <a:t>Click to edit the title text format</a:t>
             </a:r>
-            <a:endParaRPr b="0" lang="en-US" sz="4400" spc="-1" strike="noStrike">
-              <a:solidFill>
-                <a:srgbClr val="000000"/>
-              </a:solidFill>
-              <a:latin typeface="Avenir Next LT Pro"/>
+            <a:endParaRPr b="0" lang="en-US" sz="1800" spc="-1" strike="noStrike">
+              <a:latin typeface="Arial"/>
             </a:endParaRPr>
           </a:p>
         </p:txBody>
@@ -3053,124 +2858,6 @@
       <p:sp>
         <p:nvSpPr>
           <p:cNvPr id="3" name="PlaceHolder 3"/>
-          <p:cNvSpPr>
-            <a:spLocks noGrp="1"/>
-          </p:cNvSpPr>
-          <p:nvPr>
-            <p:ph type="dt"/>
-          </p:nvPr>
-        </p:nvSpPr>
-        <p:spPr>
-          <a:xfrm>
-            <a:off x="838080" y="6324480"/>
-            <a:ext cx="2742840" cy="364680"/>
-          </a:xfrm>
-          <a:prstGeom prst="rect">
-            <a:avLst/>
-          </a:prstGeom>
-        </p:spPr>
-        <p:txBody>
-          <a:bodyPr anchor="ctr">
-            <a:noAutofit/>
-          </a:bodyPr>
-          <a:p>
-            <a:pPr>
-              <a:lnSpc>
-                <a:spcPct val="100000"/>
-              </a:lnSpc>
-            </a:pPr>
-            <a:fld id="{CB2D61CB-E837-4C8A-87C9-1B32EAFBC7CA}" type="datetime1">
-              <a:rPr b="0" lang="en-US" sz="900" spc="-1" strike="noStrike">
-                <a:solidFill>
-                  <a:srgbClr val="ffffff"/>
-                </a:solidFill>
-                <a:latin typeface="Avenir Next LT Pro"/>
-              </a:rPr>
-              <a:t>10/23/2022</a:t>
-            </a:fld>
-            <a:endParaRPr b="0" lang="en-US" sz="900" spc="-1" strike="noStrike">
-              <a:latin typeface="Times New Roman"/>
-            </a:endParaRPr>
-          </a:p>
-        </p:txBody>
-      </p:sp>
-      <p:sp>
-        <p:nvSpPr>
-          <p:cNvPr id="4" name="PlaceHolder 4"/>
-          <p:cNvSpPr>
-            <a:spLocks noGrp="1"/>
-          </p:cNvSpPr>
-          <p:nvPr>
-            <p:ph type="ftr"/>
-          </p:nvPr>
-        </p:nvSpPr>
-        <p:spPr>
-          <a:xfrm>
-            <a:off x="4038480" y="6324480"/>
-            <a:ext cx="4114440" cy="364680"/>
-          </a:xfrm>
-          <a:prstGeom prst="rect">
-            <a:avLst/>
-          </a:prstGeom>
-        </p:spPr>
-        <p:txBody>
-          <a:bodyPr anchor="ctr">
-            <a:noAutofit/>
-          </a:bodyPr>
-          <a:p>
-            <a:endParaRPr b="0" lang="en-US" sz="2400" spc="-1" strike="noStrike">
-              <a:latin typeface="Times New Roman"/>
-            </a:endParaRPr>
-          </a:p>
-        </p:txBody>
-      </p:sp>
-      <p:sp>
-        <p:nvSpPr>
-          <p:cNvPr id="5" name="PlaceHolder 5"/>
-          <p:cNvSpPr>
-            <a:spLocks noGrp="1"/>
-          </p:cNvSpPr>
-          <p:nvPr>
-            <p:ph type="sldNum"/>
-          </p:nvPr>
-        </p:nvSpPr>
-        <p:spPr>
-          <a:xfrm>
-            <a:off x="8610480" y="6324480"/>
-            <a:ext cx="2742840" cy="364680"/>
-          </a:xfrm>
-          <a:prstGeom prst="rect">
-            <a:avLst/>
-          </a:prstGeom>
-        </p:spPr>
-        <p:txBody>
-          <a:bodyPr anchor="ctr">
-            <a:noAutofit/>
-          </a:bodyPr>
-          <a:p>
-            <a:pPr algn="r">
-              <a:lnSpc>
-                <a:spcPct val="100000"/>
-              </a:lnSpc>
-            </a:pPr>
-            <a:fld id="{BE4F52A6-D909-4EC9-9141-491F2D528E3B}" type="slidenum">
-              <a:rPr b="0" lang="en-US" sz="900" spc="-1" strike="noStrike">
-                <a:solidFill>
-                  <a:srgbClr val="ffffff"/>
-                </a:solidFill>
-                <a:latin typeface="Avenir Next LT Pro"/>
-              </a:rPr>
-              <a:t>&lt;number&gt;</a:t>
-            </a:fld>
-            <a:endParaRPr b="0" lang="en-US" sz="900" spc="-1" strike="noStrike">
-              <a:latin typeface="Times New Roman"/>
-            </a:endParaRPr>
-          </a:p>
-        </p:txBody>
-      </p:sp>
-      <p:sp>
-        <p:nvSpPr>
-          <p:cNvPr id="6" name="PlaceHolder 6"/>
           <p:cNvSpPr>
             <a:spLocks noGrp="1"/>
           </p:cNvSpPr>
@@ -3204,19 +2891,13 @@
               <a:buChar char=""/>
             </a:pPr>
             <a:r>
-              <a:rPr b="0" lang="en-US" sz="2800" spc="-1" strike="noStrike">
-                <a:solidFill>
-                  <a:srgbClr val="ffffff"/>
-                </a:solidFill>
-                <a:latin typeface="Avenir Next LT Pro"/>
+              <a:rPr b="0" lang="en-US" sz="3200" spc="-1" strike="noStrike">
+                <a:latin typeface="Arial"/>
               </a:rPr>
               <a:t>Click to edit the outline text format</a:t>
             </a:r>
-            <a:endParaRPr b="0" lang="en-US" sz="2800" spc="-1" strike="noStrike">
-              <a:solidFill>
-                <a:srgbClr val="ffffff"/>
-              </a:solidFill>
-              <a:latin typeface="Avenir Next LT Pro"/>
+            <a:endParaRPr b="0" lang="en-US" sz="3200" spc="-1" strike="noStrike">
+              <a:latin typeface="Arial"/>
             </a:endParaRPr>
           </a:p>
           <a:p>
@@ -3232,19 +2913,13 @@
               <a:buChar char=""/>
             </a:pPr>
             <a:r>
-              <a:rPr b="0" lang="en-US" sz="2000" spc="-1" strike="noStrike">
-                <a:solidFill>
-                  <a:srgbClr val="ffffff"/>
-                </a:solidFill>
-                <a:latin typeface="Avenir Next LT Pro"/>
+              <a:rPr b="0" lang="en-US" sz="2800" spc="-1" strike="noStrike">
+                <a:latin typeface="Arial"/>
               </a:rPr>
               <a:t>Second Outline Level</a:t>
             </a:r>
-            <a:endParaRPr b="0" lang="en-US" sz="2000" spc="-1" strike="noStrike">
-              <a:solidFill>
-                <a:srgbClr val="ffffff"/>
-              </a:solidFill>
-              <a:latin typeface="Avenir Next LT Pro"/>
+            <a:endParaRPr b="0" lang="en-US" sz="2800" spc="-1" strike="noStrike">
+              <a:latin typeface="Arial"/>
             </a:endParaRPr>
           </a:p>
           <a:p>
@@ -3260,19 +2935,13 @@
               <a:buChar char=""/>
             </a:pPr>
             <a:r>
-              <a:rPr b="0" lang="en-US" sz="1800" spc="-1" strike="noStrike">
-                <a:solidFill>
-                  <a:srgbClr val="ffffff"/>
-                </a:solidFill>
-                <a:latin typeface="Avenir Next LT Pro"/>
+              <a:rPr b="0" lang="en-US" sz="2400" spc="-1" strike="noStrike">
+                <a:latin typeface="Arial"/>
               </a:rPr>
               <a:t>Third Outline Level</a:t>
             </a:r>
-            <a:endParaRPr b="0" lang="en-US" sz="1800" spc="-1" strike="noStrike">
-              <a:solidFill>
-                <a:srgbClr val="ffffff"/>
-              </a:solidFill>
-              <a:latin typeface="Avenir Next LT Pro"/>
+            <a:endParaRPr b="0" lang="en-US" sz="2400" spc="-1" strike="noStrike">
+              <a:latin typeface="Arial"/>
             </a:endParaRPr>
           </a:p>
           <a:p>
@@ -3288,19 +2957,13 @@
               <a:buChar char=""/>
             </a:pPr>
             <a:r>
-              <a:rPr b="0" lang="en-US" sz="1800" spc="-1" strike="noStrike">
-                <a:solidFill>
-                  <a:srgbClr val="ffffff"/>
-                </a:solidFill>
-                <a:latin typeface="Avenir Next LT Pro"/>
+              <a:rPr b="0" lang="en-US" sz="2000" spc="-1" strike="noStrike">
+                <a:latin typeface="Arial"/>
               </a:rPr>
               <a:t>Fourth Outline Level</a:t>
             </a:r>
-            <a:endParaRPr b="0" lang="en-US" sz="1800" spc="-1" strike="noStrike">
-              <a:solidFill>
-                <a:srgbClr val="ffffff"/>
-              </a:solidFill>
-              <a:latin typeface="Avenir Next LT Pro"/>
+            <a:endParaRPr b="0" lang="en-US" sz="2000" spc="-1" strike="noStrike">
+              <a:latin typeface="Arial"/>
             </a:endParaRPr>
           </a:p>
           <a:p>
@@ -3317,18 +2980,12 @@
             </a:pPr>
             <a:r>
               <a:rPr b="0" lang="en-US" sz="2000" spc="-1" strike="noStrike">
-                <a:solidFill>
-                  <a:srgbClr val="ffffff"/>
-                </a:solidFill>
-                <a:latin typeface="Avenir Next LT Pro"/>
+                <a:latin typeface="Arial"/>
               </a:rPr>
               <a:t>Fifth Outline Level</a:t>
             </a:r>
             <a:endParaRPr b="0" lang="en-US" sz="2000" spc="-1" strike="noStrike">
-              <a:solidFill>
-                <a:srgbClr val="ffffff"/>
-              </a:solidFill>
-              <a:latin typeface="Avenir Next LT Pro"/>
+              <a:latin typeface="Arial"/>
             </a:endParaRPr>
           </a:p>
           <a:p>
@@ -3345,18 +3002,12 @@
             </a:pPr>
             <a:r>
               <a:rPr b="0" lang="en-US" sz="2000" spc="-1" strike="noStrike">
-                <a:solidFill>
-                  <a:srgbClr val="ffffff"/>
-                </a:solidFill>
-                <a:latin typeface="Avenir Next LT Pro"/>
+                <a:latin typeface="Arial"/>
               </a:rPr>
               <a:t>Sixth Outline Level</a:t>
             </a:r>
             <a:endParaRPr b="0" lang="en-US" sz="2000" spc="-1" strike="noStrike">
-              <a:solidFill>
-                <a:srgbClr val="ffffff"/>
-              </a:solidFill>
-              <a:latin typeface="Avenir Next LT Pro"/>
+              <a:latin typeface="Arial"/>
             </a:endParaRPr>
           </a:p>
           <a:p>
@@ -3373,18 +3024,12 @@
             </a:pPr>
             <a:r>
               <a:rPr b="0" lang="en-US" sz="2000" spc="-1" strike="noStrike">
-                <a:solidFill>
-                  <a:srgbClr val="ffffff"/>
-                </a:solidFill>
-                <a:latin typeface="Avenir Next LT Pro"/>
+                <a:latin typeface="Arial"/>
               </a:rPr>
               <a:t>Seventh Outline Level</a:t>
             </a:r>
             <a:endParaRPr b="0" lang="en-US" sz="2000" spc="-1" strike="noStrike">
-              <a:solidFill>
-                <a:srgbClr val="ffffff"/>
-              </a:solidFill>
-              <a:latin typeface="Avenir Next LT Pro"/>
+              <a:latin typeface="Arial"/>
             </a:endParaRPr>
           </a:p>
         </p:txBody>
@@ -3435,14 +3080,14 @@
       </p:grpSpPr>
       <p:sp>
         <p:nvSpPr>
-          <p:cNvPr id="43" name="CustomShape 1"/>
+          <p:cNvPr id="40" name="CustomShape 1"/>
           <p:cNvSpPr/>
           <p:nvPr/>
         </p:nvSpPr>
         <p:spPr>
           <a:xfrm>
             <a:off x="0" y="0"/>
-            <a:ext cx="12191760" cy="6857640"/>
+            <a:ext cx="12191400" cy="6857280"/>
           </a:xfrm>
           <a:prstGeom prst="rect">
             <a:avLst/>
@@ -3474,7 +3119,7 @@
       </p:sp>
       <p:pic>
         <p:nvPicPr>
-          <p:cNvPr id="44" name="Picture 39" descr=""/>
+          <p:cNvPr id="41" name="Picture 39" descr=""/>
           <p:cNvPicPr/>
           <p:nvPr/>
         </p:nvPicPr>
@@ -3487,7 +3132,7 @@
         <p:spPr>
           <a:xfrm>
             <a:off x="0" y="0"/>
-            <a:ext cx="12191760" cy="1392120"/>
+            <a:ext cx="12191400" cy="1391760"/>
           </a:xfrm>
           <a:prstGeom prst="rect">
             <a:avLst/>
@@ -3499,7 +3144,7 @@
       </p:pic>
       <p:sp>
         <p:nvSpPr>
-          <p:cNvPr id="45" name="PlaceHolder 2"/>
+          <p:cNvPr id="42" name="PlaceHolder 2"/>
           <p:cNvSpPr>
             <a:spLocks noGrp="1"/>
           </p:cNvSpPr>
@@ -3509,330 +3154,206 @@
         </p:nvSpPr>
         <p:spPr>
           <a:xfrm>
-            <a:off x="838080" y="365760"/>
-            <a:ext cx="10515240" cy="1325160"/>
-          </a:xfrm>
-          <a:prstGeom prst="rect">
-            <a:avLst/>
-          </a:prstGeom>
-        </p:spPr>
-        <p:txBody>
-          <a:bodyPr anchor="ctr">
+            <a:off x="609480" y="273600"/>
+            <a:ext cx="10972440" cy="1144800"/>
+          </a:xfrm>
+          <a:prstGeom prst="rect">
+            <a:avLst/>
+          </a:prstGeom>
+        </p:spPr>
+        <p:txBody>
+          <a:bodyPr lIns="0" rIns="0" tIns="0" bIns="0" anchor="ctr">
             <a:noAutofit/>
           </a:bodyPr>
           <a:p>
-            <a:pPr>
-              <a:lnSpc>
-                <a:spcPct val="100000"/>
-              </a:lnSpc>
+            <a:pPr algn="ctr"/>
+            <a:r>
+              <a:rPr b="0" lang="en-US" sz="4400" spc="-1" strike="noStrike">
+                <a:latin typeface="Arial"/>
+              </a:rPr>
+              <a:t>Click to edit the title text format</a:t>
+            </a:r>
+            <a:endParaRPr b="0" lang="en-US" sz="4400" spc="-1" strike="noStrike">
+              <a:latin typeface="Arial"/>
+            </a:endParaRPr>
+          </a:p>
+        </p:txBody>
+      </p:sp>
+      <p:sp>
+        <p:nvSpPr>
+          <p:cNvPr id="43" name="PlaceHolder 3"/>
+          <p:cNvSpPr>
+            <a:spLocks noGrp="1"/>
+          </p:cNvSpPr>
+          <p:nvPr>
+            <p:ph type="body"/>
+          </p:nvPr>
+        </p:nvSpPr>
+        <p:spPr>
+          <a:xfrm>
+            <a:off x="609480" y="1604520"/>
+            <a:ext cx="10972440" cy="3977280"/>
+          </a:xfrm>
+          <a:prstGeom prst="rect">
+            <a:avLst/>
+          </a:prstGeom>
+        </p:spPr>
+        <p:txBody>
+          <a:bodyPr lIns="0" rIns="0" tIns="0" bIns="0">
+            <a:normAutofit/>
+          </a:bodyPr>
+          <a:p>
+            <a:pPr marL="432000" indent="-324000">
+              <a:spcBef>
+                <a:spcPts val="1417"/>
+              </a:spcBef>
+              <a:buClr>
+                <a:srgbClr val="000000"/>
+              </a:buClr>
+              <a:buSzPct val="45000"/>
+              <a:buFont typeface="Wingdings" charset="2"/>
+              <a:buChar char=""/>
             </a:pPr>
             <a:r>
-              <a:rPr b="1" lang="en-US" sz="4400" spc="-1" strike="noStrike">
-                <a:solidFill>
-                  <a:srgbClr val="ffffff"/>
-                </a:solidFill>
-                <a:latin typeface="Avenir Next LT Pro"/>
+              <a:rPr b="0" lang="en-US" sz="3200" spc="-1" strike="noStrike">
+                <a:latin typeface="Arial"/>
               </a:rPr>
-              <a:t>Click to edit Master title style</a:t>
+              <a:t>Click to edit the outline text format</a:t>
             </a:r>
-            <a:endParaRPr b="0" lang="en-US" sz="4400" spc="-1" strike="noStrike">
-              <a:solidFill>
-                <a:srgbClr val="000000"/>
-              </a:solidFill>
-              <a:latin typeface="Avenir Next LT Pro"/>
-            </a:endParaRPr>
-          </a:p>
-        </p:txBody>
-      </p:sp>
-      <p:sp>
-        <p:nvSpPr>
-          <p:cNvPr id="46" name="PlaceHolder 3"/>
-          <p:cNvSpPr>
-            <a:spLocks noGrp="1"/>
-          </p:cNvSpPr>
-          <p:nvPr>
-            <p:ph type="body"/>
-          </p:nvPr>
-        </p:nvSpPr>
-        <p:spPr>
-          <a:xfrm>
-            <a:off x="838080" y="1949400"/>
-            <a:ext cx="10515240" cy="4195440"/>
-          </a:xfrm>
-          <a:prstGeom prst="rect">
-            <a:avLst/>
-          </a:prstGeom>
-        </p:spPr>
-        <p:txBody>
-          <a:bodyPr>
-            <a:noAutofit/>
-          </a:bodyPr>
-          <a:p>
-            <a:pPr marL="228600" indent="-228240">
-              <a:lnSpc>
-                <a:spcPct val="110000"/>
-              </a:lnSpc>
+            <a:endParaRPr b="0" lang="en-US" sz="3200" spc="-1" strike="noStrike">
+              <a:latin typeface="Arial"/>
+            </a:endParaRPr>
+          </a:p>
+          <a:p>
+            <a:pPr lvl="1" marL="864000" indent="-324000">
               <a:spcBef>
-                <a:spcPts val="1001"/>
+                <a:spcPts val="1134"/>
               </a:spcBef>
               <a:buClr>
-                <a:srgbClr val="b93fd1"/>
+                <a:srgbClr val="000000"/>
               </a:buClr>
-              <a:buFont typeface="Arial"/>
-              <a:buChar char="•"/>
+              <a:buSzPct val="75000"/>
+              <a:buFont typeface="Symbol" charset="2"/>
+              <a:buChar char=""/>
             </a:pPr>
             <a:r>
               <a:rPr b="0" lang="en-US" sz="2800" spc="-1" strike="noStrike">
-                <a:solidFill>
-                  <a:srgbClr val="ffffff"/>
-                </a:solidFill>
-                <a:latin typeface="Avenir Next LT Pro"/>
+                <a:latin typeface="Arial"/>
               </a:rPr>
-              <a:t>Click to edit Master text styles</a:t>
+              <a:t>Second Outline Level</a:t>
             </a:r>
             <a:endParaRPr b="0" lang="en-US" sz="2800" spc="-1" strike="noStrike">
-              <a:solidFill>
-                <a:srgbClr val="ffffff"/>
-              </a:solidFill>
-              <a:latin typeface="Avenir Next LT Pro"/>
-            </a:endParaRPr>
-          </a:p>
-          <a:p>
-            <a:pPr lvl="1" marL="685800" indent="-228240">
-              <a:lnSpc>
-                <a:spcPct val="110000"/>
-              </a:lnSpc>
+              <a:latin typeface="Arial"/>
+            </a:endParaRPr>
+          </a:p>
+          <a:p>
+            <a:pPr lvl="2" marL="1296000" indent="-288000">
               <a:spcBef>
-                <a:spcPts val="499"/>
+                <a:spcPts val="850"/>
               </a:spcBef>
               <a:buClr>
-                <a:srgbClr val="b93fd1"/>
+                <a:srgbClr val="000000"/>
               </a:buClr>
-              <a:buFont typeface="Arial"/>
-              <a:buChar char="•"/>
+              <a:buSzPct val="45000"/>
+              <a:buFont typeface="Wingdings" charset="2"/>
+              <a:buChar char=""/>
             </a:pPr>
             <a:r>
               <a:rPr b="0" lang="en-US" sz="2400" spc="-1" strike="noStrike">
-                <a:solidFill>
-                  <a:srgbClr val="ffffff"/>
-                </a:solidFill>
-                <a:latin typeface="Avenir Next LT Pro"/>
+                <a:latin typeface="Arial"/>
               </a:rPr>
-              <a:t>Second level</a:t>
+              <a:t>Third Outline Level</a:t>
             </a:r>
             <a:endParaRPr b="0" lang="en-US" sz="2400" spc="-1" strike="noStrike">
-              <a:solidFill>
-                <a:srgbClr val="ffffff"/>
-              </a:solidFill>
-              <a:latin typeface="Avenir Next LT Pro"/>
-            </a:endParaRPr>
-          </a:p>
-          <a:p>
-            <a:pPr lvl="2" marL="1143000" indent="-228240">
-              <a:lnSpc>
-                <a:spcPct val="110000"/>
-              </a:lnSpc>
+              <a:latin typeface="Arial"/>
+            </a:endParaRPr>
+          </a:p>
+          <a:p>
+            <a:pPr lvl="3" marL="1728000" indent="-216000">
               <a:spcBef>
-                <a:spcPts val="499"/>
+                <a:spcPts val="567"/>
               </a:spcBef>
               <a:buClr>
-                <a:srgbClr val="b93fd1"/>
+                <a:srgbClr val="000000"/>
               </a:buClr>
-              <a:buFont typeface="Arial"/>
-              <a:buChar char="•"/>
+              <a:buSzPct val="75000"/>
+              <a:buFont typeface="Symbol" charset="2"/>
+              <a:buChar char=""/>
             </a:pPr>
             <a:r>
               <a:rPr b="0" lang="en-US" sz="2000" spc="-1" strike="noStrike">
-                <a:solidFill>
-                  <a:srgbClr val="ffffff"/>
-                </a:solidFill>
-                <a:latin typeface="Avenir Next LT Pro"/>
+                <a:latin typeface="Arial"/>
               </a:rPr>
-              <a:t>Third level</a:t>
+              <a:t>Fourth Outline Level</a:t>
             </a:r>
             <a:endParaRPr b="0" lang="en-US" sz="2000" spc="-1" strike="noStrike">
-              <a:solidFill>
-                <a:srgbClr val="ffffff"/>
-              </a:solidFill>
-              <a:latin typeface="Avenir Next LT Pro"/>
-            </a:endParaRPr>
-          </a:p>
-          <a:p>
-            <a:pPr lvl="3" marL="1600200" indent="-228240">
-              <a:lnSpc>
-                <a:spcPct val="110000"/>
-              </a:lnSpc>
+              <a:latin typeface="Arial"/>
+            </a:endParaRPr>
+          </a:p>
+          <a:p>
+            <a:pPr lvl="4" marL="2160000" indent="-216000">
               <a:spcBef>
-                <a:spcPts val="499"/>
+                <a:spcPts val="283"/>
               </a:spcBef>
               <a:buClr>
-                <a:srgbClr val="b93fd1"/>
+                <a:srgbClr val="000000"/>
               </a:buClr>
-              <a:buFont typeface="Arial"/>
-              <a:buChar char="•"/>
+              <a:buSzPct val="45000"/>
+              <a:buFont typeface="Wingdings" charset="2"/>
+              <a:buChar char=""/>
             </a:pPr>
             <a:r>
-              <a:rPr b="0" lang="en-US" sz="1800" spc="-1" strike="noStrike">
-                <a:solidFill>
-                  <a:srgbClr val="ffffff"/>
-                </a:solidFill>
-                <a:latin typeface="Avenir Next LT Pro"/>
+              <a:rPr b="0" lang="en-US" sz="2000" spc="-1" strike="noStrike">
+                <a:latin typeface="Arial"/>
               </a:rPr>
-              <a:t>Fourth level</a:t>
+              <a:t>Fifth Outline Level</a:t>
             </a:r>
-            <a:endParaRPr b="0" lang="en-US" sz="1800" spc="-1" strike="noStrike">
-              <a:solidFill>
-                <a:srgbClr val="ffffff"/>
-              </a:solidFill>
-              <a:latin typeface="Avenir Next LT Pro"/>
-            </a:endParaRPr>
-          </a:p>
-          <a:p>
-            <a:pPr lvl="4" marL="2057400" indent="-228240">
-              <a:lnSpc>
-                <a:spcPct val="110000"/>
-              </a:lnSpc>
+            <a:endParaRPr b="0" lang="en-US" sz="2000" spc="-1" strike="noStrike">
+              <a:latin typeface="Arial"/>
+            </a:endParaRPr>
+          </a:p>
+          <a:p>
+            <a:pPr lvl="5" marL="2592000" indent="-216000">
               <a:spcBef>
-                <a:spcPts val="499"/>
+                <a:spcPts val="283"/>
               </a:spcBef>
               <a:buClr>
-                <a:srgbClr val="b93fd1"/>
+                <a:srgbClr val="000000"/>
               </a:buClr>
-              <a:buFont typeface="Arial"/>
-              <a:buChar char="•"/>
+              <a:buSzPct val="45000"/>
+              <a:buFont typeface="Wingdings" charset="2"/>
+              <a:buChar char=""/>
             </a:pPr>
             <a:r>
-              <a:rPr b="0" lang="en-US" sz="1800" spc="-1" strike="noStrike">
-                <a:solidFill>
-                  <a:srgbClr val="ffffff"/>
-                </a:solidFill>
-                <a:latin typeface="Avenir Next LT Pro"/>
+              <a:rPr b="0" lang="en-US" sz="2000" spc="-1" strike="noStrike">
+                <a:latin typeface="Arial"/>
               </a:rPr>
-              <a:t>Fifth level</a:t>
+              <a:t>Sixth Outline Level</a:t>
             </a:r>
-            <a:endParaRPr b="0" lang="en-US" sz="1800" spc="-1" strike="noStrike">
-              <a:solidFill>
-                <a:srgbClr val="ffffff"/>
-              </a:solidFill>
-              <a:latin typeface="Avenir Next LT Pro"/>
-            </a:endParaRPr>
-          </a:p>
-        </p:txBody>
-      </p:sp>
-      <p:sp>
-        <p:nvSpPr>
-          <p:cNvPr id="47" name="PlaceHolder 4"/>
-          <p:cNvSpPr>
-            <a:spLocks noGrp="1"/>
-          </p:cNvSpPr>
-          <p:nvPr>
-            <p:ph type="dt"/>
-          </p:nvPr>
-        </p:nvSpPr>
-        <p:spPr>
-          <a:xfrm>
-            <a:off x="838080" y="6324480"/>
-            <a:ext cx="2742840" cy="364680"/>
-          </a:xfrm>
-          <a:prstGeom prst="rect">
-            <a:avLst/>
-          </a:prstGeom>
-        </p:spPr>
-        <p:txBody>
-          <a:bodyPr anchor="ctr">
-            <a:noAutofit/>
-          </a:bodyPr>
-          <a:p>
-            <a:pPr>
-              <a:lnSpc>
-                <a:spcPct val="100000"/>
-              </a:lnSpc>
+            <a:endParaRPr b="0" lang="en-US" sz="2000" spc="-1" strike="noStrike">
+              <a:latin typeface="Arial"/>
+            </a:endParaRPr>
+          </a:p>
+          <a:p>
+            <a:pPr lvl="6" marL="3024000" indent="-216000">
+              <a:spcBef>
+                <a:spcPts val="283"/>
+              </a:spcBef>
+              <a:buClr>
+                <a:srgbClr val="000000"/>
+              </a:buClr>
+              <a:buSzPct val="45000"/>
+              <a:buFont typeface="Wingdings" charset="2"/>
+              <a:buChar char=""/>
             </a:pPr>
-            <a:fld id="{CF73823D-A39E-438D-A306-4AC443AE0AA3}" type="datetime1">
-              <a:rPr b="0" lang="en-US" sz="900" spc="-1" strike="noStrike">
-                <a:solidFill>
-                  <a:srgbClr val="ffffff"/>
-                </a:solidFill>
-                <a:latin typeface="Avenir Next LT Pro"/>
+            <a:r>
+              <a:rPr b="0" lang="en-US" sz="2000" spc="-1" strike="noStrike">
+                <a:latin typeface="Arial"/>
               </a:rPr>
-              <a:t>10/23/2022</a:t>
-            </a:fld>
-            <a:endParaRPr b="0" lang="en-US" sz="900" spc="-1" strike="noStrike">
-              <a:latin typeface="Times New Roman"/>
-            </a:endParaRPr>
-          </a:p>
-        </p:txBody>
-      </p:sp>
-      <p:sp>
-        <p:nvSpPr>
-          <p:cNvPr id="48" name="PlaceHolder 5"/>
-          <p:cNvSpPr>
-            <a:spLocks noGrp="1"/>
-          </p:cNvSpPr>
-          <p:nvPr>
-            <p:ph type="ftr"/>
-          </p:nvPr>
-        </p:nvSpPr>
-        <p:spPr>
-          <a:xfrm>
-            <a:off x="4038480" y="6324480"/>
-            <a:ext cx="4114440" cy="364680"/>
-          </a:xfrm>
-          <a:prstGeom prst="rect">
-            <a:avLst/>
-          </a:prstGeom>
-        </p:spPr>
-        <p:txBody>
-          <a:bodyPr anchor="ctr">
-            <a:noAutofit/>
-          </a:bodyPr>
-          <a:p>
-            <a:endParaRPr b="0" lang="en-US" sz="2400" spc="-1" strike="noStrike">
-              <a:latin typeface="Times New Roman"/>
-            </a:endParaRPr>
-          </a:p>
-        </p:txBody>
-      </p:sp>
-      <p:sp>
-        <p:nvSpPr>
-          <p:cNvPr id="49" name="PlaceHolder 6"/>
-          <p:cNvSpPr>
-            <a:spLocks noGrp="1"/>
-          </p:cNvSpPr>
-          <p:nvPr>
-            <p:ph type="sldNum"/>
-          </p:nvPr>
-        </p:nvSpPr>
-        <p:spPr>
-          <a:xfrm>
-            <a:off x="8610480" y="6324480"/>
-            <a:ext cx="2742840" cy="364680"/>
-          </a:xfrm>
-          <a:prstGeom prst="rect">
-            <a:avLst/>
-          </a:prstGeom>
-        </p:spPr>
-        <p:txBody>
-          <a:bodyPr anchor="ctr">
-            <a:noAutofit/>
-          </a:bodyPr>
-          <a:p>
-            <a:pPr algn="r">
-              <a:lnSpc>
-                <a:spcPct val="100000"/>
-              </a:lnSpc>
-            </a:pPr>
-            <a:fld id="{29CCC024-5081-4439-A535-ED205D261622}" type="slidenum">
-              <a:rPr b="0" lang="en-US" sz="900" spc="-1" strike="noStrike">
-                <a:solidFill>
-                  <a:srgbClr val="ffffff"/>
-                </a:solidFill>
-                <a:latin typeface="Avenir Next LT Pro"/>
-              </a:rPr>
-              <a:t>&lt;number&gt;</a:t>
-            </a:fld>
-            <a:endParaRPr b="0" lang="en-US" sz="900" spc="-1" strike="noStrike">
-              <a:latin typeface="Times New Roman"/>
+              <a:t>Seventh Outline Level</a:t>
+            </a:r>
+            <a:endParaRPr b="0" lang="en-US" sz="2000" spc="-1" strike="noStrike">
+              <a:latin typeface="Arial"/>
             </a:endParaRPr>
           </a:p>
         </p:txBody>
@@ -3883,14 +3404,14 @@
       </p:grpSpPr>
       <p:sp>
         <p:nvSpPr>
-          <p:cNvPr id="86" name="CustomShape 1"/>
+          <p:cNvPr id="80" name="CustomShape 1"/>
           <p:cNvSpPr/>
           <p:nvPr/>
         </p:nvSpPr>
         <p:spPr>
           <a:xfrm>
             <a:off x="0" y="0"/>
-            <a:ext cx="12188520" cy="6857640"/>
+            <a:ext cx="12188160" cy="6857280"/>
           </a:xfrm>
           <a:prstGeom prst="rect">
             <a:avLst/>
@@ -3919,14 +3440,14 @@
       </p:sp>
       <p:sp>
         <p:nvSpPr>
-          <p:cNvPr id="87" name="CustomShape 2"/>
+          <p:cNvPr id="81" name="CustomShape 2"/>
           <p:cNvSpPr/>
           <p:nvPr/>
         </p:nvSpPr>
         <p:spPr>
           <a:xfrm>
             <a:off x="0" y="0"/>
-            <a:ext cx="12188520" cy="6857640"/>
+            <a:ext cx="12188160" cy="6857280"/>
           </a:xfrm>
           <a:prstGeom prst="rect">
             <a:avLst/>
@@ -3955,14 +3476,14 @@
       </p:sp>
       <p:sp>
         <p:nvSpPr>
-          <p:cNvPr id="88" name="CustomShape 3"/>
+          <p:cNvPr id="82" name="CustomShape 3"/>
           <p:cNvSpPr/>
           <p:nvPr/>
         </p:nvSpPr>
         <p:spPr>
           <a:xfrm rot="10800000">
-            <a:off x="360" y="0"/>
-            <a:ext cx="12188520" cy="6857640"/>
+            <a:off x="720" y="0"/>
+            <a:ext cx="12188160" cy="6857280"/>
           </a:xfrm>
           <a:prstGeom prst="rect">
             <a:avLst/>
@@ -3994,7 +3515,7 @@
       </p:sp>
       <p:pic>
         <p:nvPicPr>
-          <p:cNvPr id="89" name="Picture 3" descr="Computer script on a screen"/>
+          <p:cNvPr id="83" name="Picture 3" descr="Computer script on a screen"/>
           <p:cNvPicPr/>
           <p:nvPr/>
         </p:nvPicPr>
@@ -4008,7 +3529,7 @@
         <p:spPr>
           <a:xfrm>
             <a:off x="0" y="0"/>
-            <a:ext cx="12188520" cy="6856200"/>
+            <a:ext cx="12188160" cy="6855840"/>
           </a:xfrm>
           <a:prstGeom prst="rect">
             <a:avLst/>
@@ -4020,14 +3541,14 @@
       </p:pic>
       <p:sp>
         <p:nvSpPr>
-          <p:cNvPr id="90" name="TextShape 4"/>
-          <p:cNvSpPr txBox="1"/>
+          <p:cNvPr id="84" name="CustomShape 4"/>
+          <p:cNvSpPr/>
           <p:nvPr/>
         </p:nvSpPr>
         <p:spPr>
           <a:xfrm>
             <a:off x="838080" y="740160"/>
-            <a:ext cx="7530480" cy="3163680"/>
+            <a:ext cx="7530120" cy="3163320"/>
           </a:xfrm>
           <a:prstGeom prst="rect">
             <a:avLst/>
@@ -4037,8 +3558,14 @@
             <a:noFill/>
           </a:ln>
         </p:spPr>
-        <p:txBody>
-          <a:bodyPr anchor="b">
+        <p:style>
+          <a:lnRef idx="0"/>
+          <a:fillRef idx="0"/>
+          <a:effectRef idx="0"/>
+          <a:fontRef idx="minor"/>
+        </p:style>
+        <p:txBody>
+          <a:bodyPr lIns="90000" rIns="90000" tIns="45000" bIns="45000" anchor="b">
             <a:normAutofit/>
           </a:bodyPr>
           <a:p>
@@ -4057,24 +3584,21 @@
               <a:t>Remote VCS: GitHub</a:t>
             </a:r>
             <a:endParaRPr b="0" lang="en-US" sz="5200" spc="-1" strike="noStrike">
-              <a:solidFill>
-                <a:srgbClr val="000000"/>
-              </a:solidFill>
-              <a:latin typeface="Avenir Next LT Pro"/>
-            </a:endParaRPr>
-          </a:p>
-        </p:txBody>
-      </p:sp>
-      <p:sp>
-        <p:nvSpPr>
-          <p:cNvPr id="91" name="TextShape 5"/>
-          <p:cNvSpPr txBox="1"/>
+              <a:latin typeface="Arial"/>
+            </a:endParaRPr>
+          </a:p>
+        </p:txBody>
+      </p:sp>
+      <p:sp>
+        <p:nvSpPr>
+          <p:cNvPr id="85" name="CustomShape 5"/>
+          <p:cNvSpPr/>
           <p:nvPr/>
         </p:nvSpPr>
         <p:spPr>
           <a:xfrm>
             <a:off x="838080" y="4074480"/>
-            <a:ext cx="7582680" cy="1278720"/>
+            <a:ext cx="7582320" cy="1278360"/>
           </a:xfrm>
           <a:prstGeom prst="rect">
             <a:avLst/>
@@ -4084,8 +3608,14 @@
             <a:noFill/>
           </a:ln>
         </p:spPr>
-        <p:txBody>
-          <a:bodyPr>
+        <p:style>
+          <a:lnRef idx="0"/>
+          <a:fillRef idx="0"/>
+          <a:effectRef idx="0"/>
+          <a:fontRef idx="minor"/>
+        </p:style>
+        <p:txBody>
+          <a:bodyPr lIns="90000" rIns="90000" tIns="45000" bIns="45000">
             <a:normAutofit/>
           </a:bodyPr>
           <a:p>
@@ -4162,7 +3692,7 @@
                                           </p:stCondLst>
                                         </p:cTn>
                                         <p:tgtEl>
-                                          <p:spTgt spid="91">
+                                          <p:spTgt spid="85">
                                             <p:txEl>
                                               <p:pRg st="0" end="0"/>
                                             </p:txEl>
@@ -4180,7 +3710,7 @@
                                       <p:cBhvr additive="repl">
                                         <p:cTn id="7" dur="700"/>
                                         <p:tgtEl>
-                                          <p:spTgt spid="91">
+                                          <p:spTgt spid="85">
                                             <p:txEl>
                                               <p:pRg st="0" end="0"/>
                                             </p:txEl>
@@ -4208,7 +3738,7 @@
                                           </p:stCondLst>
                                         </p:cTn>
                                         <p:tgtEl>
-                                          <p:spTgt spid="90"/>
+                                          <p:spTgt spid="84"/>
                                         </p:tgtEl>
                                         <p:attrNameLst>
                                           <p:attrName>style.visibility</p:attrName>
@@ -4222,7 +3752,7 @@
                                       <p:cBhvr additive="repl">
                                         <p:cTn id="10" dur="700"/>
                                         <p:tgtEl>
-                                          <p:spTgt spid="90"/>
+                                          <p:spTgt spid="84"/>
                                         </p:tgtEl>
                                       </p:cBhvr>
                                     </p:animEffect>
@@ -4279,14 +3809,14 @@
       </p:grpSpPr>
       <p:sp>
         <p:nvSpPr>
-          <p:cNvPr id="92" name="TextShape 1"/>
-          <p:cNvSpPr txBox="1"/>
+          <p:cNvPr id="86" name="CustomShape 1"/>
+          <p:cNvSpPr/>
           <p:nvPr/>
         </p:nvSpPr>
         <p:spPr>
           <a:xfrm>
             <a:off x="838080" y="36000"/>
-            <a:ext cx="10515240" cy="1325160"/>
+            <a:ext cx="10514880" cy="1324800"/>
           </a:xfrm>
           <a:prstGeom prst="rect">
             <a:avLst/>
@@ -4296,8 +3826,14 @@
             <a:noFill/>
           </a:ln>
         </p:spPr>
-        <p:txBody>
-          <a:bodyPr anchor="ctr">
+        <p:style>
+          <a:lnRef idx="0"/>
+          <a:fillRef idx="0"/>
+          <a:effectRef idx="0"/>
+          <a:fontRef idx="minor"/>
+        </p:style>
+        <p:txBody>
+          <a:bodyPr lIns="90000" rIns="90000" tIns="45000" bIns="45000" anchor="ctr">
             <a:noAutofit/>
           </a:bodyPr>
           <a:p>
@@ -4313,41 +3849,29 @@
                 </a:solidFill>
                 <a:latin typeface="Avenir Next LT Pro"/>
               </a:rPr>
-              <a:t>Create</a:t>
-            </a:r>
-            <a:r>
-              <a:rPr b="0" lang="en-US" sz="4400" spc="-1" strike="noStrike">
-                <a:solidFill>
-                  <a:srgbClr val="ffffff"/>
-                </a:solidFill>
-                <a:latin typeface="Avenir Next LT Pro"/>
-              </a:rPr>
-              <a:t> a new account</a:t>
+              <a:t>Create a new account</a:t>
             </a:r>
             <a:endParaRPr b="0" lang="en-US" sz="4400" spc="-1" strike="noStrike">
-              <a:solidFill>
-                <a:srgbClr val="000000"/>
-              </a:solidFill>
-              <a:latin typeface="Avenir Next LT Pro"/>
+              <a:latin typeface="Arial"/>
             </a:endParaRPr>
           </a:p>
         </p:txBody>
       </p:sp>
       <p:pic>
         <p:nvPicPr>
-          <p:cNvPr id="93" name="Picture 3" descr="A screenshot of a computer&#10;&#10;Description automatically generated"/>
+          <p:cNvPr id="87" name="Picture 3" descr="A screenshot of a computer&#10;&#10;Description automatically generated"/>
           <p:cNvPicPr/>
           <p:nvPr/>
         </p:nvPicPr>
         <p:blipFill>
           <a:blip r:embed="rId1"/>
-          <a:srcRect l="31195" t="17509" r="32289" b="3720"/>
+          <a:srcRect l="31191" t="17506" r="32285" b="3720"/>
           <a:stretch/>
         </p:blipFill>
         <p:spPr>
           <a:xfrm>
             <a:off x="7863840" y="1190160"/>
-            <a:ext cx="3932640" cy="5302080"/>
+            <a:ext cx="3932280" cy="5301720"/>
           </a:xfrm>
           <a:prstGeom prst="rect">
             <a:avLst/>
@@ -4359,19 +3883,19 @@
       </p:pic>
       <p:pic>
         <p:nvPicPr>
-          <p:cNvPr id="94" name="Picture 7" descr=""/>
+          <p:cNvPr id="88" name="Picture 7" descr=""/>
           <p:cNvPicPr/>
           <p:nvPr/>
         </p:nvPicPr>
         <p:blipFill>
           <a:blip r:embed="rId2"/>
-          <a:srcRect l="12039" t="3502" r="12860" b="9191"/>
+          <a:srcRect l="12037" t="3502" r="12858" b="9191"/>
           <a:stretch/>
         </p:blipFill>
         <p:spPr>
           <a:xfrm>
             <a:off x="686160" y="1828800"/>
-            <a:ext cx="6446160" cy="4681800"/>
+            <a:ext cx="6445800" cy="4681440"/>
           </a:xfrm>
           <a:prstGeom prst="rect">
             <a:avLst/>
@@ -4413,14 +3937,14 @@
       </p:grpSpPr>
       <p:sp>
         <p:nvSpPr>
-          <p:cNvPr id="95" name="TextShape 1"/>
-          <p:cNvSpPr txBox="1"/>
+          <p:cNvPr id="89" name="CustomShape 1"/>
+          <p:cNvSpPr/>
           <p:nvPr/>
         </p:nvSpPr>
         <p:spPr>
           <a:xfrm>
             <a:off x="640080" y="46440"/>
-            <a:ext cx="10515240" cy="1325160"/>
+            <a:ext cx="10514880" cy="1324800"/>
           </a:xfrm>
           <a:prstGeom prst="rect">
             <a:avLst/>
@@ -4430,8 +3954,14 @@
             <a:noFill/>
           </a:ln>
         </p:spPr>
-        <p:txBody>
-          <a:bodyPr anchor="ctr">
+        <p:style>
+          <a:lnRef idx="0"/>
+          <a:fillRef idx="0"/>
+          <a:effectRef idx="0"/>
+          <a:fontRef idx="minor"/>
+        </p:style>
+        <p:txBody>
+          <a:bodyPr lIns="90000" rIns="90000" tIns="45000" bIns="45000" anchor="ctr">
             <a:noAutofit/>
           </a:bodyPr>
           <a:p>
@@ -4450,29 +3980,26 @@
               <a:t>Create a new account</a:t>
             </a:r>
             <a:endParaRPr b="0" lang="en-US" sz="4400" spc="-1" strike="noStrike">
-              <a:solidFill>
-                <a:srgbClr val="000000"/>
-              </a:solidFill>
-              <a:latin typeface="Avenir Next LT Pro"/>
+              <a:latin typeface="Arial"/>
             </a:endParaRPr>
           </a:p>
         </p:txBody>
       </p:sp>
       <p:pic>
         <p:nvPicPr>
-          <p:cNvPr id="96" name="Picture 3" descr=""/>
+          <p:cNvPr id="90" name="Picture 3" descr=""/>
           <p:cNvPicPr/>
           <p:nvPr/>
         </p:nvPicPr>
         <p:blipFill>
           <a:blip r:embed="rId1"/>
-          <a:srcRect l="55000" t="13131" r="16008" b="35890"/>
+          <a:srcRect l="54994" t="13131" r="16006" b="35887"/>
           <a:stretch/>
         </p:blipFill>
         <p:spPr>
           <a:xfrm>
             <a:off x="2690280" y="1564560"/>
-            <a:ext cx="3984840" cy="4379040"/>
+            <a:ext cx="3984480" cy="4378680"/>
           </a:xfrm>
           <a:prstGeom prst="rect">
             <a:avLst/>
@@ -4484,19 +4011,19 @@
       </p:pic>
       <p:pic>
         <p:nvPicPr>
-          <p:cNvPr id="97" name="Picture 4" descr=""/>
+          <p:cNvPr id="91" name="Picture 4" descr=""/>
           <p:cNvPicPr/>
           <p:nvPr/>
         </p:nvPicPr>
         <p:blipFill>
           <a:blip r:embed="rId2"/>
-          <a:srcRect l="55348" t="13594" r="16144" b="-1165"/>
+          <a:srcRect l="55341" t="13594" r="16142" b="-1165"/>
           <a:stretch/>
         </p:blipFill>
         <p:spPr>
           <a:xfrm>
             <a:off x="7955280" y="548640"/>
-            <a:ext cx="2854440" cy="5486400"/>
+            <a:ext cx="2854080" cy="5486040"/>
           </a:xfrm>
           <a:prstGeom prst="rect">
             <a:avLst/>
@@ -4508,14 +4035,14 @@
       </p:pic>
       <p:sp>
         <p:nvSpPr>
-          <p:cNvPr id="98" name="CustomShape 2"/>
+          <p:cNvPr id="92" name="CustomShape 2"/>
           <p:cNvSpPr/>
           <p:nvPr/>
         </p:nvSpPr>
         <p:spPr>
           <a:xfrm>
             <a:off x="548640" y="6309360"/>
-            <a:ext cx="11247120" cy="426960"/>
+            <a:ext cx="11246760" cy="425520"/>
           </a:xfrm>
           <a:prstGeom prst="rect">
             <a:avLst/>
@@ -4532,7 +4059,7 @@
           <a:fontRef idx="minor"/>
         </p:style>
         <p:txBody>
-          <a:bodyPr>
+          <a:bodyPr lIns="90000" rIns="90000" tIns="45000" bIns="45000">
             <a:spAutoFit/>
           </a:bodyPr>
           <a:p>
@@ -4547,6 +4074,7 @@
                   <a:srgbClr val="ffffff"/>
                 </a:solidFill>
                 <a:latin typeface="Avenir Next LT Pro"/>
+                <a:ea typeface="DejaVu Sans"/>
               </a:rPr>
               <a:t>Enter a code sent to your email, and voila … Your account is created!</a:t>
             </a:r>
@@ -4588,14 +4116,14 @@
       </p:grpSpPr>
       <p:sp>
         <p:nvSpPr>
-          <p:cNvPr id="99" name="TextShape 1"/>
-          <p:cNvSpPr txBox="1"/>
+          <p:cNvPr id="93" name="CustomShape 1"/>
+          <p:cNvSpPr/>
           <p:nvPr/>
         </p:nvSpPr>
         <p:spPr>
           <a:xfrm>
             <a:off x="838080" y="1949400"/>
-            <a:ext cx="10515240" cy="4195440"/>
+            <a:ext cx="10514880" cy="4195080"/>
           </a:xfrm>
           <a:prstGeom prst="rect">
             <a:avLst/>
@@ -4605,12 +4133,18 @@
             <a:noFill/>
           </a:ln>
         </p:spPr>
-        <p:txBody>
-          <a:bodyPr>
+        <p:style>
+          <a:lnRef idx="0"/>
+          <a:fillRef idx="0"/>
+          <a:effectRef idx="0"/>
+          <a:fontRef idx="minor"/>
+        </p:style>
+        <p:txBody>
+          <a:bodyPr lIns="90000" rIns="90000" tIns="45000" bIns="45000">
             <a:normAutofit fontScale="73000"/>
           </a:bodyPr>
           <a:p>
-            <a:pPr marL="228600" indent="-228240">
+            <a:pPr marL="228600" indent="-227880">
               <a:lnSpc>
                 <a:spcPct val="110000"/>
               </a:lnSpc>
@@ -4634,10 +4168,7 @@
               <a:t>Check if SSH is set on your machine:</a:t>
             </a:r>
             <a:endParaRPr b="0" lang="en-US" sz="2800" spc="-1" strike="noStrike">
-              <a:solidFill>
-                <a:srgbClr val="ffffff"/>
-              </a:solidFill>
-              <a:latin typeface="Avenir Next LT Pro"/>
+              <a:latin typeface="Arial"/>
             </a:endParaRPr>
           </a:p>
           <a:p>
@@ -4663,14 +4194,11 @@
               <a:t>ls -al ~/.ssh</a:t>
             </a:r>
             <a:endParaRPr b="0" lang="en-US" sz="2400" spc="-1" strike="noStrike">
-              <a:solidFill>
-                <a:srgbClr val="ffffff"/>
-              </a:solidFill>
-              <a:latin typeface="Avenir Next LT Pro"/>
-            </a:endParaRPr>
-          </a:p>
-          <a:p>
-            <a:pPr marL="228600" indent="-228240">
+              <a:latin typeface="Arial"/>
+            </a:endParaRPr>
+          </a:p>
+          <a:p>
+            <a:pPr marL="228600" indent="-227880">
               <a:lnSpc>
                 <a:spcPct val="110000"/>
               </a:lnSpc>
@@ -4697,10 +4225,7 @@
               <a:t>If empty:</a:t>
             </a:r>
             <a:endParaRPr b="0" lang="en-US" sz="2800" spc="-1" strike="noStrike">
-              <a:solidFill>
-                <a:srgbClr val="ffffff"/>
-              </a:solidFill>
-              <a:latin typeface="Avenir Next LT Pro"/>
+              <a:latin typeface="Arial"/>
             </a:endParaRPr>
           </a:p>
           <a:p>
@@ -4738,14 +4263,11 @@
               <a:t>your_email@example.com</a:t>
             </a:r>
             <a:endParaRPr b="0" lang="en-US" sz="2400" spc="-1" strike="noStrike">
-              <a:solidFill>
-                <a:srgbClr val="ffffff"/>
-              </a:solidFill>
-              <a:latin typeface="Avenir Next LT Pro"/>
-            </a:endParaRPr>
-          </a:p>
-          <a:p>
-            <a:pPr marL="228600" indent="-228240">
+              <a:latin typeface="Arial"/>
+            </a:endParaRPr>
+          </a:p>
+          <a:p>
+            <a:pPr marL="228600" indent="-227880">
               <a:lnSpc>
                 <a:spcPct val="110000"/>
               </a:lnSpc>
@@ -4772,14 +4294,11 @@
               <a:t>Follow the instructions, and for each prompt press enter</a:t>
             </a:r>
             <a:endParaRPr b="0" lang="en-US" sz="2800" spc="-1" strike="noStrike">
-              <a:solidFill>
-                <a:srgbClr val="ffffff"/>
-              </a:solidFill>
-              <a:latin typeface="Avenir Next LT Pro"/>
-            </a:endParaRPr>
-          </a:p>
-          <a:p>
-            <a:pPr marL="228600" indent="-228240">
+              <a:latin typeface="Arial"/>
+            </a:endParaRPr>
+          </a:p>
+          <a:p>
+            <a:pPr marL="228600" indent="-227880">
               <a:lnSpc>
                 <a:spcPct val="110000"/>
               </a:lnSpc>
@@ -4806,10 +4325,7 @@
               <a:t>Check again if SSH is set:</a:t>
             </a:r>
             <a:endParaRPr b="0" lang="en-US" sz="2800" spc="-1" strike="noStrike">
-              <a:solidFill>
-                <a:srgbClr val="ffffff"/>
-              </a:solidFill>
-              <a:latin typeface="Avenir Next LT Pro"/>
+              <a:latin typeface="Arial"/>
             </a:endParaRPr>
           </a:p>
           <a:p>
@@ -4835,14 +4351,11 @@
               <a:t>ls -al ~/.ssh</a:t>
             </a:r>
             <a:endParaRPr b="0" lang="en-US" sz="2400" spc="-1" strike="noStrike">
-              <a:solidFill>
-                <a:srgbClr val="ffffff"/>
-              </a:solidFill>
-              <a:latin typeface="Avenir Next LT Pro"/>
-            </a:endParaRPr>
-          </a:p>
-          <a:p>
-            <a:pPr marL="228600" indent="-228240">
+              <a:latin typeface="Arial"/>
+            </a:endParaRPr>
+          </a:p>
+          <a:p>
+            <a:pPr marL="228600" indent="-227880">
               <a:lnSpc>
                 <a:spcPct val="110000"/>
               </a:lnSpc>
@@ -4869,10 +4382,7 @@
               <a:t>2 files should be listed: </a:t>
             </a:r>
             <a:endParaRPr b="0" lang="en-US" sz="2800" spc="-1" strike="noStrike">
-              <a:solidFill>
-                <a:srgbClr val="ffffff"/>
-              </a:solidFill>
-              <a:latin typeface="Avenir Next LT Pro"/>
+              <a:latin typeface="Arial"/>
             </a:endParaRPr>
           </a:p>
           <a:p>
@@ -4898,10 +4408,7 @@
               <a:t>id_rsa</a:t>
             </a:r>
             <a:endParaRPr b="0" lang="en-US" sz="2400" spc="-1" strike="noStrike">
-              <a:solidFill>
-                <a:srgbClr val="ffffff"/>
-              </a:solidFill>
-              <a:latin typeface="Avenir Next LT Pro"/>
+              <a:latin typeface="Arial"/>
             </a:endParaRPr>
           </a:p>
           <a:p>
@@ -4927,14 +4434,11 @@
               <a:t>id_rsa.pub</a:t>
             </a:r>
             <a:endParaRPr b="0" lang="en-US" sz="2400" spc="-1" strike="noStrike">
-              <a:solidFill>
-                <a:srgbClr val="ffffff"/>
-              </a:solidFill>
-              <a:latin typeface="Avenir Next LT Pro"/>
-            </a:endParaRPr>
-          </a:p>
-          <a:p>
-            <a:pPr>
+              <a:latin typeface="Arial"/>
+            </a:endParaRPr>
+          </a:p>
+          <a:p>
+            <a:pPr marL="457200">
               <a:lnSpc>
                 <a:spcPct val="110000"/>
               </a:lnSpc>
@@ -4946,24 +4450,21 @@
               </a:tabLst>
             </a:pPr>
             <a:endParaRPr b="0" lang="en-US" sz="2400" spc="-1" strike="noStrike">
-              <a:solidFill>
-                <a:srgbClr val="ffffff"/>
-              </a:solidFill>
-              <a:latin typeface="Avenir Next LT Pro"/>
-            </a:endParaRPr>
-          </a:p>
-        </p:txBody>
-      </p:sp>
-      <p:sp>
-        <p:nvSpPr>
-          <p:cNvPr id="100" name="TextShape 2"/>
-          <p:cNvSpPr txBox="1"/>
+              <a:latin typeface="Arial"/>
+            </a:endParaRPr>
+          </a:p>
+        </p:txBody>
+      </p:sp>
+      <p:sp>
+        <p:nvSpPr>
+          <p:cNvPr id="94" name="CustomShape 2"/>
+          <p:cNvSpPr/>
           <p:nvPr/>
         </p:nvSpPr>
         <p:spPr>
           <a:xfrm>
             <a:off x="838440" y="46800"/>
-            <a:ext cx="10515240" cy="1325160"/>
+            <a:ext cx="10514880" cy="1324800"/>
           </a:xfrm>
           <a:prstGeom prst="rect">
             <a:avLst/>
@@ -4973,8 +4474,14 @@
             <a:noFill/>
           </a:ln>
         </p:spPr>
-        <p:txBody>
-          <a:bodyPr anchor="ctr">
+        <p:style>
+          <a:lnRef idx="0"/>
+          <a:fillRef idx="0"/>
+          <a:effectRef idx="0"/>
+          <a:fontRef idx="minor"/>
+        </p:style>
+        <p:txBody>
+          <a:bodyPr lIns="90000" rIns="90000" tIns="45000" bIns="45000" anchor="ctr">
             <a:noAutofit/>
           </a:bodyPr>
           <a:p>
@@ -4994,10 +4501,7 @@
               <a:t>SSH Authorization Key Setup</a:t>
             </a:r>
             <a:endParaRPr b="0" lang="en-US" sz="4400" spc="-1" strike="noStrike">
-              <a:solidFill>
-                <a:srgbClr val="000000"/>
-              </a:solidFill>
-              <a:latin typeface="Avenir Next LT Pro"/>
+              <a:latin typeface="Arial"/>
             </a:endParaRPr>
           </a:p>
         </p:txBody>
@@ -5034,14 +4538,14 @@
       </p:grpSpPr>
       <p:sp>
         <p:nvSpPr>
-          <p:cNvPr id="101" name="TextShape 1"/>
-          <p:cNvSpPr txBox="1"/>
+          <p:cNvPr id="95" name="CustomShape 1"/>
+          <p:cNvSpPr/>
           <p:nvPr/>
         </p:nvSpPr>
         <p:spPr>
           <a:xfrm>
             <a:off x="838080" y="46440"/>
-            <a:ext cx="10515240" cy="1325160"/>
+            <a:ext cx="10514880" cy="1324800"/>
           </a:xfrm>
           <a:prstGeom prst="rect">
             <a:avLst/>
@@ -5051,8 +4555,14 @@
             <a:noFill/>
           </a:ln>
         </p:spPr>
-        <p:txBody>
-          <a:bodyPr anchor="ctr">
+        <p:style>
+          <a:lnRef idx="0"/>
+          <a:fillRef idx="0"/>
+          <a:effectRef idx="0"/>
+          <a:fontRef idx="minor"/>
+        </p:style>
+        <p:txBody>
+          <a:bodyPr lIns="90000" rIns="90000" tIns="45000" bIns="45000" anchor="ctr">
             <a:noAutofit/>
           </a:bodyPr>
           <a:p>
@@ -5072,24 +4582,21 @@
               <a:t>SSH Authorization Key Setup</a:t>
             </a:r>
             <a:endParaRPr b="0" lang="en-US" sz="4400" spc="-1" strike="noStrike">
-              <a:solidFill>
-                <a:srgbClr val="000000"/>
-              </a:solidFill>
-              <a:latin typeface="Avenir Next LT Pro"/>
-            </a:endParaRPr>
-          </a:p>
-        </p:txBody>
-      </p:sp>
-      <p:sp>
-        <p:nvSpPr>
-          <p:cNvPr id="102" name="TextShape 2"/>
-          <p:cNvSpPr txBox="1"/>
+              <a:latin typeface="Arial"/>
+            </a:endParaRPr>
+          </a:p>
+        </p:txBody>
+      </p:sp>
+      <p:sp>
+        <p:nvSpPr>
+          <p:cNvPr id="96" name="CustomShape 2"/>
+          <p:cNvSpPr/>
           <p:nvPr/>
         </p:nvSpPr>
         <p:spPr>
           <a:xfrm>
             <a:off x="838080" y="1949400"/>
-            <a:ext cx="10515240" cy="4195440"/>
+            <a:ext cx="10514880" cy="4195080"/>
           </a:xfrm>
           <a:prstGeom prst="rect">
             <a:avLst/>
@@ -5099,12 +4606,18 @@
             <a:noFill/>
           </a:ln>
         </p:spPr>
-        <p:txBody>
-          <a:bodyPr>
-            <a:normAutofit fontScale="35000"/>
-          </a:bodyPr>
-          <a:p>
-            <a:pPr marL="228600" indent="-228240">
+        <p:style>
+          <a:lnRef idx="0"/>
+          <a:fillRef idx="0"/>
+          <a:effectRef idx="0"/>
+          <a:fontRef idx="minor"/>
+        </p:style>
+        <p:txBody>
+          <a:bodyPr lIns="90000" rIns="90000" tIns="45000" bIns="45000">
+            <a:normAutofit fontScale="28000"/>
+          </a:bodyPr>
+          <a:p>
+            <a:pPr marL="228600" indent="-227880">
               <a:lnSpc>
                 <a:spcPct val="110000"/>
               </a:lnSpc>
@@ -5128,14 +4641,11 @@
               <a:t>Edit and copy the public key (id_rsa.pub): </a:t>
             </a:r>
             <a:endParaRPr b="0" lang="en-US" sz="2800" spc="-1" strike="noStrike">
-              <a:solidFill>
-                <a:srgbClr val="ffffff"/>
-              </a:solidFill>
-              <a:latin typeface="Avenir Next LT Pro"/>
-            </a:endParaRPr>
-          </a:p>
-          <a:p>
-            <a:pPr marL="228600" indent="-228240">
+              <a:latin typeface="Arial"/>
+            </a:endParaRPr>
+          </a:p>
+          <a:p>
+            <a:pPr marL="228600" indent="-227880">
               <a:lnSpc>
                 <a:spcPct val="110000"/>
               </a:lnSpc>
@@ -5159,14 +4669,11 @@
               <a:t>Now go to your GitHub account</a:t>
             </a:r>
             <a:endParaRPr b="0" lang="en-US" sz="2800" spc="-1" strike="noStrike">
-              <a:solidFill>
-                <a:srgbClr val="ffffff"/>
-              </a:solidFill>
-              <a:latin typeface="Avenir Next LT Pro"/>
-            </a:endParaRPr>
-          </a:p>
-          <a:p>
-            <a:pPr marL="228600" indent="-228240">
+              <a:latin typeface="Arial"/>
+            </a:endParaRPr>
+          </a:p>
+          <a:p>
+            <a:pPr marL="228600" indent="-227880">
               <a:lnSpc>
                 <a:spcPct val="110000"/>
               </a:lnSpc>
@@ -5190,14 +4697,11 @@
               <a:t>Click on your profile icon in the top right corner to get the drop-down menu. </a:t>
             </a:r>
             <a:endParaRPr b="0" lang="en-US" sz="2800" spc="-1" strike="noStrike">
-              <a:solidFill>
-                <a:srgbClr val="ffffff"/>
-              </a:solidFill>
-              <a:latin typeface="Avenir Next LT Pro"/>
-            </a:endParaRPr>
-          </a:p>
-          <a:p>
-            <a:pPr marL="228600" indent="-228240">
+              <a:latin typeface="Arial"/>
+            </a:endParaRPr>
+          </a:p>
+          <a:p>
+            <a:pPr marL="228600" indent="-227880">
               <a:lnSpc>
                 <a:spcPct val="110000"/>
               </a:lnSpc>
@@ -5221,14 +4725,11 @@
               <a:t>Click “Settings,” then on the settings page, click “SSH and GPG keys,” on the left side “Account settings” menu. </a:t>
             </a:r>
             <a:endParaRPr b="0" lang="en-US" sz="2800" spc="-1" strike="noStrike">
-              <a:solidFill>
-                <a:srgbClr val="ffffff"/>
-              </a:solidFill>
-              <a:latin typeface="Avenir Next LT Pro"/>
-            </a:endParaRPr>
-          </a:p>
-          <a:p>
-            <a:pPr marL="228600" indent="-228240">
+              <a:latin typeface="Arial"/>
+            </a:endParaRPr>
+          </a:p>
+          <a:p>
+            <a:pPr marL="228600" indent="-227880">
               <a:lnSpc>
                 <a:spcPct val="110000"/>
               </a:lnSpc>
@@ -5252,14 +4753,11 @@
               <a:t>Click the “New SSH key” button on the right side. </a:t>
             </a:r>
             <a:endParaRPr b="0" lang="en-US" sz="2800" spc="-1" strike="noStrike">
-              <a:solidFill>
-                <a:srgbClr val="ffffff"/>
-              </a:solidFill>
-              <a:latin typeface="Avenir Next LT Pro"/>
-            </a:endParaRPr>
-          </a:p>
-          <a:p>
-            <a:pPr marL="228600" indent="-228240">
+              <a:latin typeface="Arial"/>
+            </a:endParaRPr>
+          </a:p>
+          <a:p>
+            <a:pPr marL="228600" indent="-227880">
               <a:lnSpc>
                 <a:spcPct val="110000"/>
               </a:lnSpc>
@@ -5283,14 +4781,11 @@
               <a:t>Add some recognizable title, paste your SSH key into the field, and click the “Add SSH key” to complete the setup.</a:t>
             </a:r>
             <a:endParaRPr b="0" lang="en-US" sz="2800" spc="-1" strike="noStrike">
-              <a:solidFill>
-                <a:srgbClr val="ffffff"/>
-              </a:solidFill>
-              <a:latin typeface="Avenir Next LT Pro"/>
-            </a:endParaRPr>
-          </a:p>
-          <a:p>
-            <a:pPr marL="228600" indent="-228240">
+              <a:latin typeface="Arial"/>
+            </a:endParaRPr>
+          </a:p>
+          <a:p>
+            <a:pPr marL="228600" indent="-227880">
               <a:lnSpc>
                 <a:spcPct val="110000"/>
               </a:lnSpc>
@@ -5314,10 +4809,7 @@
               <a:t>All set. Check your authentication from the command line:</a:t>
             </a:r>
             <a:endParaRPr b="0" lang="en-US" sz="2800" spc="-1" strike="noStrike">
-              <a:solidFill>
-                <a:srgbClr val="ffffff"/>
-              </a:solidFill>
-              <a:latin typeface="Avenir Next LT Pro"/>
+              <a:latin typeface="Arial"/>
             </a:endParaRPr>
           </a:p>
           <a:p>
@@ -5355,10 +4847,7 @@
               <a:t>git@github.com</a:t>
             </a:r>
             <a:endParaRPr b="0" lang="en-US" sz="2400" spc="-1" strike="noStrike">
-              <a:solidFill>
-                <a:srgbClr val="ffffff"/>
-              </a:solidFill>
-              <a:latin typeface="Avenir Next LT Pro"/>
+              <a:latin typeface="Arial"/>
             </a:endParaRPr>
           </a:p>
           <a:p>
@@ -5381,17 +4870,100 @@
                 <a:latin typeface="Avenir Next LT Pro"/>
                 <a:ea typeface="Avenir Next LT Pro"/>
               </a:rPr>
-              <a:t>$ Hi &lt;user&gt;! You've successfully authenticated, but GitHub does not provide shell access.</a:t>
+              <a:t>$ Hi &lt;user&gt;! You've successfully authenticated, </a:t>
+            </a:r>
+            <a:r>
+              <a:rPr b="0" lang="en-US" sz="2400" spc="-1" strike="noStrike">
+                <a:solidFill>
+                  <a:srgbClr val="000000"/>
+                </a:solidFill>
+                <a:highlight>
+                  <a:srgbClr val="ffff00"/>
+                </a:highlight>
+                <a:latin typeface="Avenir Next LT Pro"/>
+                <a:ea typeface="Avenir Next LT Pro"/>
+              </a:rPr>
+              <a:t>but GitHub does not provide shell access.</a:t>
             </a:r>
             <a:endParaRPr b="0" lang="en-US" sz="2400" spc="-1" strike="noStrike">
-              <a:solidFill>
-                <a:srgbClr val="ffffff"/>
-              </a:solidFill>
-              <a:latin typeface="Avenir Next LT Pro"/>
-            </a:endParaRPr>
-          </a:p>
-          <a:p>
-            <a:pPr>
+              <a:latin typeface="Arial"/>
+            </a:endParaRPr>
+          </a:p>
+          <a:p>
+            <a:pPr marL="457200">
+              <a:lnSpc>
+                <a:spcPct val="110000"/>
+              </a:lnSpc>
+              <a:spcBef>
+                <a:spcPts val="499"/>
+              </a:spcBef>
+              <a:tabLst>
+                <a:tab algn="l" pos="0"/>
+              </a:tabLst>
+            </a:pPr>
+            <a:r>
+              <a:rPr b="0" lang="en-US" sz="2400" spc="-1" strike="noStrike">
+                <a:solidFill>
+                  <a:srgbClr val="ffffff"/>
+                </a:solidFill>
+                <a:latin typeface="Avenir Next LT Pro"/>
+                <a:ea typeface="Avenir Next LT Pro"/>
+              </a:rPr>
+              <a:t>To fix, try:</a:t>
+            </a:r>
+            <a:endParaRPr b="0" lang="en-US" sz="2400" spc="-1" strike="noStrike">
+              <a:latin typeface="Arial"/>
+            </a:endParaRPr>
+          </a:p>
+          <a:p>
+            <a:pPr marL="457200">
+              <a:lnSpc>
+                <a:spcPct val="110000"/>
+              </a:lnSpc>
+              <a:spcBef>
+                <a:spcPts val="499"/>
+              </a:spcBef>
+              <a:tabLst>
+                <a:tab algn="l" pos="0"/>
+              </a:tabLst>
+            </a:pPr>
+            <a:r>
+              <a:rPr b="0" lang="en-US" sz="2400" spc="-1" strike="noStrike">
+                <a:solidFill>
+                  <a:srgbClr val="ffffff"/>
+                </a:solidFill>
+                <a:latin typeface="Avenir Next LT Pro"/>
+                <a:ea typeface="Avenir Next LT Pro"/>
+              </a:rPr>
+              <a:t>$ git remote set-url origin </a:t>
+            </a:r>
+            <a:r>
+              <a:rPr b="0" lang="en-US" sz="2400" spc="-1" strike="noStrike">
+                <a:solidFill>
+                  <a:srgbClr val="ffffff"/>
+                </a:solidFill>
+                <a:latin typeface="Avenir Next LT Pro"/>
+                <a:ea typeface="Avenir Next LT Pro"/>
+                <a:hlinkClick r:id="rId2"/>
+              </a:rPr>
+              <a:t>git@github.com</a:t>
+            </a:r>
+            <a:r>
+              <a:rPr b="0" lang="en-US" sz="2400" spc="-1" strike="noStrike">
+                <a:solidFill>
+                  <a:srgbClr val="ffffff"/>
+                </a:solidFill>
+                <a:latin typeface="Avenir Next LT Pro"/>
+                <a:ea typeface="Avenir Next LT Pro"/>
+              </a:rPr>
+              <a:t>:[username]/[remote_repository].git</a:t>
+            </a:r>
+            <a:endParaRPr b="0" lang="en-US" sz="2400" spc="-1" strike="noStrike">
+              <a:latin typeface="Arial"/>
+            </a:endParaRPr>
+          </a:p>
+          <a:p>
+            <a:pPr marL="457200">
               <a:lnSpc>
                 <a:spcPct val="110000"/>
               </a:lnSpc>
@@ -5403,14 +4975,11 @@
               </a:tabLst>
             </a:pPr>
             <a:endParaRPr b="0" lang="en-US" sz="2400" spc="-1" strike="noStrike">
-              <a:solidFill>
-                <a:srgbClr val="ffffff"/>
-              </a:solidFill>
-              <a:latin typeface="Avenir Next LT Pro"/>
-            </a:endParaRPr>
-          </a:p>
-          <a:p>
-            <a:pPr>
+              <a:latin typeface="Arial"/>
+            </a:endParaRPr>
+          </a:p>
+          <a:p>
+            <a:pPr marL="457200">
               <a:lnSpc>
                 <a:spcPct val="110000"/>
               </a:lnSpc>
@@ -5422,10 +4991,7 @@
               </a:tabLst>
             </a:pPr>
             <a:endParaRPr b="0" lang="en-US" sz="2400" spc="-1" strike="noStrike">
-              <a:solidFill>
-                <a:srgbClr val="ffffff"/>
-              </a:solidFill>
-              <a:latin typeface="Avenir Next LT Pro"/>
+              <a:latin typeface="Arial"/>
             </a:endParaRPr>
           </a:p>
         </p:txBody>
@@ -5462,19 +5028,19 @@
       </p:grpSpPr>
       <p:pic>
         <p:nvPicPr>
-          <p:cNvPr id="103" name="Picture 4" descr="Graphical user interface, text, application, email&#10;&#10;Description automatically generated"/>
+          <p:cNvPr id="97" name="Picture 4" descr="Graphical user interface, text, application, email&#10;&#10;Description automatically generated"/>
           <p:cNvPicPr/>
           <p:nvPr/>
         </p:nvPicPr>
         <p:blipFill>
           <a:blip r:embed="rId1"/>
-          <a:srcRect l="3992" t="5707" r="27104" b="2854"/>
+          <a:srcRect l="3992" t="5707" r="27100" b="2854"/>
           <a:stretch/>
         </p:blipFill>
         <p:spPr>
           <a:xfrm>
             <a:off x="316800" y="1379160"/>
-            <a:ext cx="6411960" cy="5329800"/>
+            <a:ext cx="6411600" cy="5329440"/>
           </a:xfrm>
           <a:prstGeom prst="rect">
             <a:avLst/>
@@ -5486,19 +5052,19 @@
       </p:pic>
       <p:pic>
         <p:nvPicPr>
-          <p:cNvPr id="104" name="Picture 6" descr=""/>
+          <p:cNvPr id="98" name="Picture 6" descr=""/>
           <p:cNvPicPr/>
           <p:nvPr/>
         </p:nvPicPr>
         <p:blipFill>
           <a:blip r:embed="rId2"/>
-          <a:srcRect l="31575" t="18532" r="21846" b="-545"/>
+          <a:srcRect l="31571" t="18529" r="21843" b="-545"/>
           <a:stretch/>
         </p:blipFill>
         <p:spPr>
           <a:xfrm>
             <a:off x="6990840" y="1379880"/>
-            <a:ext cx="4853880" cy="5366880"/>
+            <a:ext cx="4853520" cy="5366520"/>
           </a:xfrm>
           <a:prstGeom prst="rect">
             <a:avLst/>
@@ -5510,14 +5076,14 @@
       </p:pic>
       <p:sp>
         <p:nvSpPr>
-          <p:cNvPr id="105" name="CustomShape 1"/>
+          <p:cNvPr id="99" name="CustomShape 1"/>
           <p:cNvSpPr/>
           <p:nvPr/>
         </p:nvSpPr>
         <p:spPr>
           <a:xfrm>
             <a:off x="281520" y="2427480"/>
-            <a:ext cx="1119240" cy="629280"/>
+            <a:ext cx="1118880" cy="628920"/>
           </a:xfrm>
           <a:prstGeom prst="ellipse">
             <a:avLst/>
@@ -5546,14 +5112,14 @@
       </p:sp>
       <p:sp>
         <p:nvSpPr>
-          <p:cNvPr id="106" name="TextShape 2"/>
-          <p:cNvSpPr txBox="1"/>
+          <p:cNvPr id="100" name="CustomShape 2"/>
+          <p:cNvSpPr/>
           <p:nvPr/>
         </p:nvSpPr>
         <p:spPr>
           <a:xfrm>
             <a:off x="914760" y="55080"/>
-            <a:ext cx="10515240" cy="1325160"/>
+            <a:ext cx="10514880" cy="1324800"/>
           </a:xfrm>
           <a:prstGeom prst="rect">
             <a:avLst/>
@@ -5563,8 +5129,14 @@
             <a:noFill/>
           </a:ln>
         </p:spPr>
-        <p:txBody>
-          <a:bodyPr anchor="ctr">
+        <p:style>
+          <a:lnRef idx="0"/>
+          <a:fillRef idx="0"/>
+          <a:effectRef idx="0"/>
+          <a:fontRef idx="minor"/>
+        </p:style>
+        <p:txBody>
+          <a:bodyPr lIns="90000" rIns="90000" tIns="45000" bIns="45000" anchor="ctr">
             <a:noAutofit/>
           </a:bodyPr>
           <a:p>
@@ -5583,10 +5155,7 @@
               <a:t>Create a repository on GitHub</a:t>
             </a:r>
             <a:endParaRPr b="0" lang="en-US" sz="4400" spc="-1" strike="noStrike">
-              <a:solidFill>
-                <a:srgbClr val="000000"/>
-              </a:solidFill>
-              <a:latin typeface="Avenir Next LT Pro"/>
+              <a:latin typeface="Arial"/>
             </a:endParaRPr>
           </a:p>
         </p:txBody>
@@ -5623,14 +5192,14 @@
       </p:grpSpPr>
       <p:sp>
         <p:nvSpPr>
-          <p:cNvPr id="107" name="TextShape 1"/>
-          <p:cNvSpPr txBox="1"/>
+          <p:cNvPr id="101" name="CustomShape 1"/>
+          <p:cNvSpPr/>
           <p:nvPr/>
         </p:nvSpPr>
         <p:spPr>
           <a:xfrm>
             <a:off x="914400" y="54720"/>
-            <a:ext cx="10515240" cy="1325160"/>
+            <a:ext cx="10514880" cy="1324800"/>
           </a:xfrm>
           <a:prstGeom prst="rect">
             <a:avLst/>
@@ -5640,8 +5209,14 @@
             <a:noFill/>
           </a:ln>
         </p:spPr>
-        <p:txBody>
-          <a:bodyPr anchor="ctr">
+        <p:style>
+          <a:lnRef idx="0"/>
+          <a:fillRef idx="0"/>
+          <a:effectRef idx="0"/>
+          <a:fontRef idx="minor"/>
+        </p:style>
+        <p:txBody>
+          <a:bodyPr lIns="90000" rIns="90000" tIns="45000" bIns="45000" anchor="ctr">
             <a:noAutofit/>
           </a:bodyPr>
           <a:p>
@@ -5660,29 +5235,26 @@
               <a:t>Create a repository on GitHub</a:t>
             </a:r>
             <a:endParaRPr b="0" lang="en-US" sz="4400" spc="-1" strike="noStrike">
-              <a:solidFill>
-                <a:srgbClr val="000000"/>
-              </a:solidFill>
-              <a:latin typeface="Avenir Next LT Pro"/>
+              <a:latin typeface="Arial"/>
             </a:endParaRPr>
           </a:p>
         </p:txBody>
       </p:sp>
       <p:pic>
         <p:nvPicPr>
-          <p:cNvPr id="108" name="Picture 4" descr="Graphical user interface, text, application, email&#10;&#10;Description automatically generated"/>
+          <p:cNvPr id="102" name="Picture 4" descr="Graphical user interface, text, application, email&#10;&#10;Description automatically generated"/>
           <p:cNvPicPr/>
           <p:nvPr/>
         </p:nvPicPr>
         <p:blipFill>
           <a:blip r:embed="rId1"/>
-          <a:srcRect l="3992" t="5707" r="27104" b="2854"/>
+          <a:srcRect l="3992" t="5707" r="27100" b="2854"/>
           <a:stretch/>
         </p:blipFill>
         <p:spPr>
           <a:xfrm>
             <a:off x="316800" y="1379160"/>
-            <a:ext cx="6411960" cy="5329800"/>
+            <a:ext cx="6411600" cy="5329440"/>
           </a:xfrm>
           <a:prstGeom prst="rect">
             <a:avLst/>
@@ -5694,19 +5266,19 @@
       </p:pic>
       <p:pic>
         <p:nvPicPr>
-          <p:cNvPr id="109" name="Picture 6" descr=""/>
+          <p:cNvPr id="103" name="Picture 6" descr=""/>
           <p:cNvPicPr/>
           <p:nvPr/>
         </p:nvPicPr>
         <p:blipFill>
           <a:blip r:embed="rId2"/>
-          <a:srcRect l="31575" t="18532" r="21846" b="-545"/>
+          <a:srcRect l="31571" t="18529" r="21843" b="-545"/>
           <a:stretch/>
         </p:blipFill>
         <p:spPr>
           <a:xfrm>
             <a:off x="6990840" y="1379880"/>
-            <a:ext cx="4853880" cy="5366880"/>
+            <a:ext cx="4853520" cy="5366520"/>
           </a:xfrm>
           <a:prstGeom prst="rect">
             <a:avLst/>
@@ -5718,14 +5290,14 @@
       </p:pic>
       <p:sp>
         <p:nvSpPr>
-          <p:cNvPr id="110" name="CustomShape 2"/>
+          <p:cNvPr id="104" name="CustomShape 2"/>
           <p:cNvSpPr/>
           <p:nvPr/>
         </p:nvSpPr>
         <p:spPr>
           <a:xfrm>
             <a:off x="281520" y="2427480"/>
-            <a:ext cx="1119240" cy="629280"/>
+            <a:ext cx="1118880" cy="628920"/>
           </a:xfrm>
           <a:prstGeom prst="ellipse">
             <a:avLst/>
@@ -5754,14 +5326,14 @@
       </p:sp>
       <p:sp>
         <p:nvSpPr>
-          <p:cNvPr id="111" name="CustomShape 3"/>
+          <p:cNvPr id="105" name="CustomShape 3"/>
           <p:cNvSpPr/>
           <p:nvPr/>
         </p:nvSpPr>
         <p:spPr>
           <a:xfrm>
             <a:off x="0" y="6229440"/>
-            <a:ext cx="12192120" cy="579240"/>
+            <a:ext cx="12191760" cy="577800"/>
           </a:xfrm>
           <a:prstGeom prst="rect">
             <a:avLst/>
@@ -5778,7 +5350,7 @@
           <a:fontRef idx="minor"/>
         </p:style>
         <p:txBody>
-          <a:bodyPr>
+          <a:bodyPr lIns="90000" rIns="90000" tIns="45000" bIns="45000">
             <a:spAutoFit/>
           </a:bodyPr>
           <a:p>

</xml_diff>